<commit_message>
+ Add "idea" slide
</commit_message>
<xml_diff>
--- a/projectPresentation/WatchOut Presentation.pptx
+++ b/projectPresentation/WatchOut Presentation.pptx
@@ -5,7 +5,7 @@
     <p:sldMasterId id="2147483648" r:id="rId1"/>
   </p:sldMasterIdLst>
   <p:notesMasterIdLst>
-    <p:notesMasterId r:id="rId21"/>
+    <p:notesMasterId r:id="rId22"/>
   </p:notesMasterIdLst>
   <p:sldIdLst>
     <p:sldId id="256" r:id="rId2"/>
@@ -22,11 +22,12 @@
     <p:sldId id="289" r:id="rId13"/>
     <p:sldId id="283" r:id="rId14"/>
     <p:sldId id="291" r:id="rId15"/>
-    <p:sldId id="292" r:id="rId16"/>
-    <p:sldId id="297" r:id="rId17"/>
-    <p:sldId id="298" r:id="rId18"/>
-    <p:sldId id="299" r:id="rId19"/>
-    <p:sldId id="300" r:id="rId20"/>
+    <p:sldId id="301" r:id="rId16"/>
+    <p:sldId id="292" r:id="rId17"/>
+    <p:sldId id="297" r:id="rId18"/>
+    <p:sldId id="298" r:id="rId19"/>
+    <p:sldId id="299" r:id="rId20"/>
+    <p:sldId id="300" r:id="rId21"/>
   </p:sldIdLst>
   <p:sldSz cx="12192000" cy="6858000"/>
   <p:notesSz cx="6858000" cy="9144000"/>
@@ -3674,56 +3675,12 @@
           <a:chExt cx="0" cy="0"/>
         </a:xfrm>
       </p:grpSpPr>
-      <p:sp>
-        <p:nvSpPr>
-          <p:cNvPr id="3" name="Subtitle 2">
-            <a:extLst>
-              <a:ext uri="{FF2B5EF4-FFF2-40B4-BE49-F238E27FC236}">
-                <a16:creationId xmlns:a16="http://schemas.microsoft.com/office/drawing/2014/main" id="{E10372F9-DB85-4C41-8882-72975BD3F840}"/>
-              </a:ext>
-            </a:extLst>
-          </p:cNvPr>
-          <p:cNvSpPr>
-            <a:spLocks noGrp="1"/>
-          </p:cNvSpPr>
-          <p:nvPr>
-            <p:ph type="subTitle" idx="1"/>
-          </p:nvPr>
-        </p:nvSpPr>
-        <p:spPr>
-          <a:xfrm>
-            <a:off x="1523999" y="3208633"/>
-            <a:ext cx="9144000" cy="1655762"/>
-          </a:xfrm>
-        </p:spPr>
-        <p:txBody>
-          <a:bodyPr/>
-          <a:lstStyle/>
-          <a:p>
-            <a:r>
-              <a:rPr lang="de-DE" dirty="0"/>
-              <a:t>Huynh Bao </a:t>
-            </a:r>
-            <a:r>
-              <a:rPr lang="de-DE" dirty="0" err="1"/>
-              <a:t>Trung</a:t>
-            </a:r>
-            <a:r>
-              <a:rPr lang="de-DE" dirty="0"/>
-              <a:t> Nguyen, Andreas Stiller, Luke Gavin</a:t>
-            </a:r>
-          </a:p>
-          <a:p>
-            <a:endParaRPr lang="de-DE" dirty="0"/>
-          </a:p>
-        </p:txBody>
-      </p:sp>
       <p:pic>
         <p:nvPicPr>
-          <p:cNvPr id="9" name="Picture 8" descr="A picture containing drawing&#10;&#10;Description automatically generated">
-            <a:extLst>
-              <a:ext uri="{FF2B5EF4-FFF2-40B4-BE49-F238E27FC236}">
-                <a16:creationId xmlns:a16="http://schemas.microsoft.com/office/drawing/2014/main" id="{AB671166-F0C8-4B17-84D1-DC7166FEBA86}"/>
+          <p:cNvPr id="4" name="Picture 3" descr="A close up of a logo&#10;&#10;Description automatically generated">
+            <a:extLst>
+              <a:ext uri="{FF2B5EF4-FFF2-40B4-BE49-F238E27FC236}">
+                <a16:creationId xmlns:a16="http://schemas.microsoft.com/office/drawing/2014/main" id="{E0521686-C618-47B7-9000-C038A6DA92A7}"/>
               </a:ext>
             </a:extLst>
           </p:cNvPr>
@@ -3746,14 +3703,58 @@
         </p:blipFill>
         <p:spPr>
           <a:xfrm>
-            <a:off x="3305030" y="1260431"/>
-            <a:ext cx="5581937" cy="1708238"/>
+            <a:off x="3657599" y="770233"/>
+            <a:ext cx="4876800" cy="4876800"/>
           </a:xfrm>
           <a:prstGeom prst="rect">
             <a:avLst/>
           </a:prstGeom>
         </p:spPr>
       </p:pic>
+      <p:sp>
+        <p:nvSpPr>
+          <p:cNvPr id="3" name="Subtitle 2">
+            <a:extLst>
+              <a:ext uri="{FF2B5EF4-FFF2-40B4-BE49-F238E27FC236}">
+                <a16:creationId xmlns:a16="http://schemas.microsoft.com/office/drawing/2014/main" id="{E10372F9-DB85-4C41-8882-72975BD3F840}"/>
+              </a:ext>
+            </a:extLst>
+          </p:cNvPr>
+          <p:cNvSpPr>
+            <a:spLocks noGrp="1"/>
+          </p:cNvSpPr>
+          <p:nvPr>
+            <p:ph type="subTitle" idx="1"/>
+          </p:nvPr>
+        </p:nvSpPr>
+        <p:spPr>
+          <a:xfrm>
+            <a:off x="1523999" y="5101228"/>
+            <a:ext cx="9144000" cy="1655762"/>
+          </a:xfrm>
+        </p:spPr>
+        <p:txBody>
+          <a:bodyPr/>
+          <a:lstStyle/>
+          <a:p>
+            <a:r>
+              <a:rPr lang="de-DE" dirty="0"/>
+              <a:t>Huynh Bao </a:t>
+            </a:r>
+            <a:r>
+              <a:rPr lang="de-DE" dirty="0" err="1"/>
+              <a:t>Trung</a:t>
+            </a:r>
+            <a:r>
+              <a:rPr lang="de-DE" dirty="0"/>
+              <a:t> Nguyen, Andreas Stiller, Luke Gavin</a:t>
+            </a:r>
+          </a:p>
+          <a:p>
+            <a:endParaRPr lang="de-DE" dirty="0"/>
+          </a:p>
+        </p:txBody>
+      </p:sp>
     </p:spTree>
     <p:extLst>
       <p:ext uri="{BB962C8B-B14F-4D97-AF65-F5344CB8AC3E}">
@@ -5265,7 +5266,7 @@
           <p:cNvPr id="2" name="Title 1">
             <a:extLst>
               <a:ext uri="{FF2B5EF4-FFF2-40B4-BE49-F238E27FC236}">
-                <a16:creationId xmlns:a16="http://schemas.microsoft.com/office/drawing/2014/main" id="{4EBB9E41-D53E-4376-A98F-5448BD4EC638}"/>
+                <a16:creationId xmlns:a16="http://schemas.microsoft.com/office/drawing/2014/main" id="{3FA7DF47-F845-4251-BD28-7B4C341FD651}"/>
               </a:ext>
             </a:extLst>
           </p:cNvPr>
@@ -5283,66 +5284,164 @@
           <a:p>
             <a:pPr algn="ctr"/>
             <a:r>
+              <a:rPr lang="de-DE" dirty="0"/>
+              <a:t>Additional </a:t>
+            </a:r>
+            <a:r>
+              <a:rPr lang="de-DE" dirty="0" err="1"/>
+              <a:t>ideas</a:t>
+            </a:r>
+            <a:r>
+              <a:rPr lang="de-DE" dirty="0"/>
+              <a:t> &amp; </a:t>
+            </a:r>
+            <a:r>
+              <a:rPr lang="de-DE" dirty="0" err="1"/>
+              <a:t>changes</a:t>
+            </a:r>
+            <a:endParaRPr lang="en-GB" dirty="0"/>
+          </a:p>
+        </p:txBody>
+      </p:sp>
+      <p:sp>
+        <p:nvSpPr>
+          <p:cNvPr id="3" name="Content Placeholder 2">
+            <a:extLst>
+              <a:ext uri="{FF2B5EF4-FFF2-40B4-BE49-F238E27FC236}">
+                <a16:creationId xmlns:a16="http://schemas.microsoft.com/office/drawing/2014/main" id="{5B71D88D-2510-42D2-82EE-9363D00EF2B9}"/>
+              </a:ext>
+            </a:extLst>
+          </p:cNvPr>
+          <p:cNvSpPr>
+            <a:spLocks noGrp="1"/>
+          </p:cNvSpPr>
+          <p:nvPr>
+            <p:ph idx="1"/>
+          </p:nvPr>
+        </p:nvSpPr>
+        <p:spPr>
+          <a:xfrm>
+            <a:off x="838200" y="1825625"/>
+            <a:ext cx="10515600" cy="4351338"/>
+          </a:xfrm>
+        </p:spPr>
+        <p:txBody>
+          <a:bodyPr>
+            <a:normAutofit lnSpcReduction="10000"/>
+          </a:bodyPr>
+          <a:lstStyle/>
+          <a:p>
+            <a:r>
+              <a:rPr lang="de-DE" dirty="0"/>
+              <a:t>More </a:t>
+            </a:r>
+            <a:r>
+              <a:rPr lang="de-DE" dirty="0" err="1"/>
+              <a:t>task</a:t>
+            </a:r>
+            <a:r>
               <a:rPr lang="en-GB" dirty="0"/>
-              <a:t>Code examples</a:t>
-            </a:r>
+              <a:t>s	</a:t>
+            </a:r>
+          </a:p>
+          <a:p>
+            <a:pPr lvl="1"/>
+            <a:r>
+              <a:rPr lang="en-GB" dirty="0"/>
+              <a:t>Knock Rhythm with help of Sound recording</a:t>
+            </a:r>
+          </a:p>
+          <a:p>
+            <a:pPr lvl="1"/>
+            <a:r>
+              <a:rPr lang="en-GB" dirty="0"/>
+              <a:t>Count Shakes</a:t>
+            </a:r>
+          </a:p>
+          <a:p>
+            <a:pPr lvl="1"/>
+            <a:r>
+              <a:rPr lang="en-GB" dirty="0"/>
+              <a:t>Ball balance</a:t>
+            </a:r>
+          </a:p>
+          <a:p>
+            <a:r>
+              <a:rPr lang="en-GB" dirty="0" err="1"/>
+              <a:t>Highscore</a:t>
+            </a:r>
+            <a:r>
+              <a:rPr lang="en-GB" dirty="0"/>
+              <a:t> for Players</a:t>
+            </a:r>
+          </a:p>
+          <a:p>
+            <a:r>
+              <a:rPr lang="en-GB" dirty="0"/>
+              <a:t>Better unwrap Directions of Use</a:t>
+            </a:r>
+          </a:p>
+          <a:p>
+            <a:r>
+              <a:rPr lang="en-GB" dirty="0"/>
+              <a:t>More Twitch Directions of Movement</a:t>
+            </a:r>
+          </a:p>
+          <a:p>
+            <a:r>
+              <a:rPr lang="en-GB" dirty="0"/>
+              <a:t>Structure of program</a:t>
+            </a:r>
+          </a:p>
+          <a:p>
+            <a:pPr lvl="1"/>
+            <a:r>
+              <a:rPr lang="en-GB" dirty="0"/>
+              <a:t>More Abstraction</a:t>
+            </a:r>
+          </a:p>
+          <a:p>
+            <a:pPr lvl="1"/>
+            <a:r>
+              <a:rPr lang="en-GB" dirty="0"/>
+              <a:t>More polymorphism</a:t>
+            </a:r>
+          </a:p>
+          <a:p>
+            <a:endParaRPr lang="en-GB" dirty="0"/>
+          </a:p>
+          <a:p>
+            <a:pPr lvl="1"/>
+            <a:endParaRPr lang="en-GB" dirty="0"/>
+          </a:p>
+          <a:p>
+            <a:pPr lvl="2"/>
+            <a:endParaRPr lang="en-GB" dirty="0"/>
+          </a:p>
+          <a:p>
+            <a:pPr lvl="1"/>
+            <a:endParaRPr lang="en-GB" dirty="0"/>
+          </a:p>
+          <a:p>
+            <a:pPr lvl="2"/>
+            <a:endParaRPr lang="en-GB" dirty="0"/>
+          </a:p>
+          <a:p>
+            <a:pPr lvl="1"/>
+            <a:endParaRPr lang="en-GB" dirty="0"/>
+          </a:p>
+          <a:p>
+            <a:pPr lvl="1"/>
             <a:endParaRPr lang="de-DE" dirty="0"/>
           </a:p>
         </p:txBody>
       </p:sp>
       <p:sp>
         <p:nvSpPr>
-          <p:cNvPr id="3" name="Content Placeholder 2">
-            <a:extLst>
-              <a:ext uri="{FF2B5EF4-FFF2-40B4-BE49-F238E27FC236}">
-                <a16:creationId xmlns:a16="http://schemas.microsoft.com/office/drawing/2014/main" id="{688DDCCC-3442-4F95-AD39-7A5E7E906537}"/>
-              </a:ext>
-            </a:extLst>
-          </p:cNvPr>
-          <p:cNvSpPr>
-            <a:spLocks noGrp="1"/>
-          </p:cNvSpPr>
-          <p:nvPr>
-            <p:ph idx="1"/>
-          </p:nvPr>
-        </p:nvSpPr>
-        <p:spPr/>
-        <p:txBody>
-          <a:bodyPr/>
-          <a:lstStyle/>
-          <a:p>
-            <a:r>
-              <a:rPr lang="en-GB" dirty="0"/>
-              <a:t>Twitch</a:t>
-            </a:r>
-          </a:p>
-          <a:p>
-            <a:r>
-              <a:rPr lang="en-GB" dirty="0"/>
-              <a:t>Light manager</a:t>
-            </a:r>
-          </a:p>
-          <a:p>
-            <a:r>
-              <a:rPr lang="en-GB" dirty="0"/>
-              <a:t>Unwrap</a:t>
-            </a:r>
-          </a:p>
-          <a:p>
-            <a:r>
-              <a:rPr lang="en-GB" dirty="0"/>
-              <a:t>Deliver</a:t>
-            </a:r>
-            <a:endParaRPr lang="de-DE" dirty="0"/>
-          </a:p>
-        </p:txBody>
-      </p:sp>
-      <p:sp>
-        <p:nvSpPr>
           <p:cNvPr id="4" name="Slide Number Placeholder 3">
             <a:extLst>
               <a:ext uri="{FF2B5EF4-FFF2-40B4-BE49-F238E27FC236}">
-                <a16:creationId xmlns:a16="http://schemas.microsoft.com/office/drawing/2014/main" id="{25DF7500-0441-4913-A8E7-A9C6D7DB5ADD}"/>
+                <a16:creationId xmlns:a16="http://schemas.microsoft.com/office/drawing/2014/main" id="{5FBC4890-7A13-450E-9EFB-CCDFFFA05B48}"/>
               </a:ext>
             </a:extLst>
           </p:cNvPr>
@@ -5370,7 +5469,7 @@
     </p:spTree>
     <p:extLst>
       <p:ext uri="{BB962C8B-B14F-4D97-AF65-F5344CB8AC3E}">
-        <p14:creationId xmlns:p14="http://schemas.microsoft.com/office/powerpoint/2010/main" val="345537623"/>
+        <p14:creationId xmlns:p14="http://schemas.microsoft.com/office/powerpoint/2010/main" val="394130377"/>
       </p:ext>
     </p:extLst>
   </p:cSld>
@@ -5402,6 +5501,143 @@
           <p:cNvPr id="2" name="Title 1">
             <a:extLst>
               <a:ext uri="{FF2B5EF4-FFF2-40B4-BE49-F238E27FC236}">
+                <a16:creationId xmlns:a16="http://schemas.microsoft.com/office/drawing/2014/main" id="{4EBB9E41-D53E-4376-A98F-5448BD4EC638}"/>
+              </a:ext>
+            </a:extLst>
+          </p:cNvPr>
+          <p:cNvSpPr>
+            <a:spLocks noGrp="1"/>
+          </p:cNvSpPr>
+          <p:nvPr>
+            <p:ph type="title"/>
+          </p:nvPr>
+        </p:nvSpPr>
+        <p:spPr/>
+        <p:txBody>
+          <a:bodyPr/>
+          <a:lstStyle/>
+          <a:p>
+            <a:pPr algn="ctr"/>
+            <a:r>
+              <a:rPr lang="en-GB" dirty="0"/>
+              <a:t>Code examples</a:t>
+            </a:r>
+            <a:endParaRPr lang="de-DE" dirty="0"/>
+          </a:p>
+        </p:txBody>
+      </p:sp>
+      <p:sp>
+        <p:nvSpPr>
+          <p:cNvPr id="3" name="Content Placeholder 2">
+            <a:extLst>
+              <a:ext uri="{FF2B5EF4-FFF2-40B4-BE49-F238E27FC236}">
+                <a16:creationId xmlns:a16="http://schemas.microsoft.com/office/drawing/2014/main" id="{688DDCCC-3442-4F95-AD39-7A5E7E906537}"/>
+              </a:ext>
+            </a:extLst>
+          </p:cNvPr>
+          <p:cNvSpPr>
+            <a:spLocks noGrp="1"/>
+          </p:cNvSpPr>
+          <p:nvPr>
+            <p:ph idx="1"/>
+          </p:nvPr>
+        </p:nvSpPr>
+        <p:spPr/>
+        <p:txBody>
+          <a:bodyPr/>
+          <a:lstStyle/>
+          <a:p>
+            <a:r>
+              <a:rPr lang="en-GB" dirty="0"/>
+              <a:t>Twitch</a:t>
+            </a:r>
+          </a:p>
+          <a:p>
+            <a:r>
+              <a:rPr lang="en-GB" dirty="0"/>
+              <a:t>Light manager</a:t>
+            </a:r>
+          </a:p>
+          <a:p>
+            <a:r>
+              <a:rPr lang="en-GB" dirty="0"/>
+              <a:t>Unwrap</a:t>
+            </a:r>
+          </a:p>
+          <a:p>
+            <a:r>
+              <a:rPr lang="en-GB" dirty="0"/>
+              <a:t>Deliver</a:t>
+            </a:r>
+            <a:endParaRPr lang="de-DE" dirty="0"/>
+          </a:p>
+        </p:txBody>
+      </p:sp>
+      <p:sp>
+        <p:nvSpPr>
+          <p:cNvPr id="4" name="Slide Number Placeholder 3">
+            <a:extLst>
+              <a:ext uri="{FF2B5EF4-FFF2-40B4-BE49-F238E27FC236}">
+                <a16:creationId xmlns:a16="http://schemas.microsoft.com/office/drawing/2014/main" id="{25DF7500-0441-4913-A8E7-A9C6D7DB5ADD}"/>
+              </a:ext>
+            </a:extLst>
+          </p:cNvPr>
+          <p:cNvSpPr>
+            <a:spLocks noGrp="1"/>
+          </p:cNvSpPr>
+          <p:nvPr>
+            <p:ph type="sldNum" sz="quarter" idx="12"/>
+          </p:nvPr>
+        </p:nvSpPr>
+        <p:spPr/>
+        <p:txBody>
+          <a:bodyPr/>
+          <a:lstStyle/>
+          <a:p>
+            <a:fld id="{5FA8D64E-092D-488F-9555-4FE258A6A447}" type="slidenum">
+              <a:rPr lang="de-DE" smtClean="0"/>
+              <a:pPr/>
+              <a:t>16</a:t>
+            </a:fld>
+            <a:endParaRPr lang="de-DE" dirty="0"/>
+          </a:p>
+        </p:txBody>
+      </p:sp>
+    </p:spTree>
+    <p:extLst>
+      <p:ext uri="{BB962C8B-B14F-4D97-AF65-F5344CB8AC3E}">
+        <p14:creationId xmlns:p14="http://schemas.microsoft.com/office/powerpoint/2010/main" val="345537623"/>
+      </p:ext>
+    </p:extLst>
+  </p:cSld>
+  <p:clrMapOvr>
+    <a:masterClrMapping/>
+  </p:clrMapOvr>
+</p:sld>
+</file>
+
+<file path=ppt/slides/slide17.xml><?xml version="1.0" encoding="utf-8"?>
+<p:sld xmlns:a="http://schemas.openxmlformats.org/drawingml/2006/main" xmlns:r="http://schemas.openxmlformats.org/officeDocument/2006/relationships" xmlns:p="http://schemas.openxmlformats.org/presentationml/2006/main">
+  <p:cSld>
+    <p:spTree>
+      <p:nvGrpSpPr>
+        <p:cNvPr id="1" name=""/>
+        <p:cNvGrpSpPr/>
+        <p:nvPr/>
+      </p:nvGrpSpPr>
+      <p:grpSpPr>
+        <a:xfrm>
+          <a:off x="0" y="0"/>
+          <a:ext cx="0" cy="0"/>
+          <a:chOff x="0" y="0"/>
+          <a:chExt cx="0" cy="0"/>
+        </a:xfrm>
+      </p:grpSpPr>
+      <p:sp>
+        <p:nvSpPr>
+          <p:cNvPr id="2" name="Title 1">
+            <a:extLst>
+              <a:ext uri="{FF2B5EF4-FFF2-40B4-BE49-F238E27FC236}">
                 <a16:creationId xmlns:a16="http://schemas.microsoft.com/office/drawing/2014/main" id="{077A55E0-63C4-4323-986A-FE3EAF60ECB4}"/>
               </a:ext>
             </a:extLst>
@@ -5495,7 +5731,7 @@
             <a:fld id="{5FA8D64E-092D-488F-9555-4FE258A6A447}" type="slidenum">
               <a:rPr lang="de-DE" smtClean="0"/>
               <a:pPr/>
-              <a:t>16</a:t>
+              <a:t>17</a:t>
             </a:fld>
             <a:endParaRPr lang="de-DE" dirty="0"/>
           </a:p>
@@ -5785,7 +6021,7 @@
 </p:sld>
 </file>
 
-<file path=ppt/slides/slide17.xml><?xml version="1.0" encoding="utf-8"?>
+<file path=ppt/slides/slide18.xml><?xml version="1.0" encoding="utf-8"?>
 <p:sld xmlns:a="http://schemas.openxmlformats.org/drawingml/2006/main" xmlns:r="http://schemas.openxmlformats.org/officeDocument/2006/relationships" xmlns:p="http://schemas.openxmlformats.org/presentationml/2006/main">
   <p:cSld>
     <p:spTree>
@@ -5899,7 +6135,7 @@
             <a:fld id="{5FA8D64E-092D-488F-9555-4FE258A6A447}" type="slidenum">
               <a:rPr lang="de-DE" smtClean="0"/>
               <a:pPr/>
-              <a:t>17</a:t>
+              <a:t>18</a:t>
             </a:fld>
             <a:endParaRPr lang="de-DE" dirty="0"/>
           </a:p>
@@ -5954,7 +6190,7 @@
 </p:sld>
 </file>
 
-<file path=ppt/slides/slide18.xml><?xml version="1.0" encoding="utf-8"?>
+<file path=ppt/slides/slide19.xml><?xml version="1.0" encoding="utf-8"?>
 <p:sld xmlns:a="http://schemas.openxmlformats.org/drawingml/2006/main" xmlns:r="http://schemas.openxmlformats.org/officeDocument/2006/relationships" xmlns:p="http://schemas.openxmlformats.org/presentationml/2006/main">
   <p:cSld>
     <p:spTree>
@@ -6058,7 +6294,7 @@
             <a:fld id="{5FA8D64E-092D-488F-9555-4FE258A6A447}" type="slidenum">
               <a:rPr lang="de-DE" smtClean="0"/>
               <a:pPr/>
-              <a:t>18</a:t>
+              <a:t>19</a:t>
             </a:fld>
             <a:endParaRPr lang="de-DE" dirty="0"/>
           </a:p>
@@ -6113,167 +6349,6 @@
 </p:sld>
 </file>
 
-<file path=ppt/slides/slide19.xml><?xml version="1.0" encoding="utf-8"?>
-<p:sld xmlns:a="http://schemas.openxmlformats.org/drawingml/2006/main" xmlns:r="http://schemas.openxmlformats.org/officeDocument/2006/relationships" xmlns:p="http://schemas.openxmlformats.org/presentationml/2006/main">
-  <p:cSld>
-    <p:spTree>
-      <p:nvGrpSpPr>
-        <p:cNvPr id="1" name=""/>
-        <p:cNvGrpSpPr/>
-        <p:nvPr/>
-      </p:nvGrpSpPr>
-      <p:grpSpPr>
-        <a:xfrm>
-          <a:off x="0" y="0"/>
-          <a:ext cx="0" cy="0"/>
-          <a:chOff x="0" y="0"/>
-          <a:chExt cx="0" cy="0"/>
-        </a:xfrm>
-      </p:grpSpPr>
-      <p:pic>
-        <p:nvPicPr>
-          <p:cNvPr id="8" name="Picture 7" descr="A screenshot of a social media post&#10;&#10;Description automatically generated">
-            <a:extLst>
-              <a:ext uri="{FF2B5EF4-FFF2-40B4-BE49-F238E27FC236}">
-                <a16:creationId xmlns:a16="http://schemas.microsoft.com/office/drawing/2014/main" id="{6FF1FBFC-E536-4965-9C90-D5AE9109D8E1}"/>
-              </a:ext>
-            </a:extLst>
-          </p:cNvPr>
-          <p:cNvPicPr>
-            <a:picLocks noChangeAspect="1"/>
-          </p:cNvPicPr>
-          <p:nvPr/>
-        </p:nvPicPr>
-        <p:blipFill>
-          <a:blip r:embed="rId2">
-            <a:extLst>
-              <a:ext uri="{28A0092B-C50C-407E-A947-70E740481C1C}">
-                <a14:useLocalDpi xmlns:a14="http://schemas.microsoft.com/office/drawing/2010/main" val="0"/>
-              </a:ext>
-            </a:extLst>
-          </a:blip>
-          <a:stretch>
-            <a:fillRect/>
-          </a:stretch>
-        </p:blipFill>
-        <p:spPr>
-          <a:xfrm>
-            <a:off x="838197" y="2489000"/>
-            <a:ext cx="11024864" cy="4104000"/>
-          </a:xfrm>
-          <a:prstGeom prst="rect">
-            <a:avLst/>
-          </a:prstGeom>
-        </p:spPr>
-      </p:pic>
-      <p:sp>
-        <p:nvSpPr>
-          <p:cNvPr id="2" name="Title 1">
-            <a:extLst>
-              <a:ext uri="{FF2B5EF4-FFF2-40B4-BE49-F238E27FC236}">
-                <a16:creationId xmlns:a16="http://schemas.microsoft.com/office/drawing/2014/main" id="{840336D5-8B75-40CA-B0C9-190D0E8F297B}"/>
-              </a:ext>
-            </a:extLst>
-          </p:cNvPr>
-          <p:cNvSpPr>
-            <a:spLocks noGrp="1"/>
-          </p:cNvSpPr>
-          <p:nvPr>
-            <p:ph type="title"/>
-          </p:nvPr>
-        </p:nvSpPr>
-        <p:spPr/>
-        <p:txBody>
-          <a:bodyPr/>
-          <a:lstStyle/>
-          <a:p>
-            <a:pPr algn="ctr"/>
-            <a:r>
-              <a:rPr lang="de-DE" dirty="0"/>
-              <a:t>Twitch Code</a:t>
-            </a:r>
-            <a:endParaRPr lang="en-GB" dirty="0"/>
-          </a:p>
-        </p:txBody>
-      </p:sp>
-      <p:sp>
-        <p:nvSpPr>
-          <p:cNvPr id="3" name="Content Placeholder 2">
-            <a:extLst>
-              <a:ext uri="{FF2B5EF4-FFF2-40B4-BE49-F238E27FC236}">
-                <a16:creationId xmlns:a16="http://schemas.microsoft.com/office/drawing/2014/main" id="{B9283830-3920-478C-9132-ADFC86ED846A}"/>
-              </a:ext>
-            </a:extLst>
-          </p:cNvPr>
-          <p:cNvSpPr>
-            <a:spLocks noGrp="1"/>
-          </p:cNvSpPr>
-          <p:nvPr>
-            <p:ph idx="1"/>
-          </p:nvPr>
-        </p:nvSpPr>
-        <p:spPr>
-          <a:xfrm>
-            <a:off x="838200" y="1825625"/>
-            <a:ext cx="10515600" cy="460375"/>
-          </a:xfrm>
-        </p:spPr>
-        <p:txBody>
-          <a:bodyPr>
-            <a:normAutofit lnSpcReduction="10000"/>
-          </a:bodyPr>
-          <a:lstStyle/>
-          <a:p>
-            <a:r>
-              <a:rPr lang="en-GB" dirty="0"/>
-              <a:t>Navigator</a:t>
-            </a:r>
-          </a:p>
-        </p:txBody>
-      </p:sp>
-      <p:sp>
-        <p:nvSpPr>
-          <p:cNvPr id="4" name="Slide Number Placeholder 3">
-            <a:extLst>
-              <a:ext uri="{FF2B5EF4-FFF2-40B4-BE49-F238E27FC236}">
-                <a16:creationId xmlns:a16="http://schemas.microsoft.com/office/drawing/2014/main" id="{5F3B4A6E-1EFA-40F3-B63D-6A2C956993B6}"/>
-              </a:ext>
-            </a:extLst>
-          </p:cNvPr>
-          <p:cNvSpPr>
-            <a:spLocks noGrp="1"/>
-          </p:cNvSpPr>
-          <p:nvPr>
-            <p:ph type="sldNum" sz="quarter" idx="12"/>
-          </p:nvPr>
-        </p:nvSpPr>
-        <p:spPr/>
-        <p:txBody>
-          <a:bodyPr/>
-          <a:lstStyle/>
-          <a:p>
-            <a:fld id="{5FA8D64E-092D-488F-9555-4FE258A6A447}" type="slidenum">
-              <a:rPr lang="de-DE" smtClean="0"/>
-              <a:pPr/>
-              <a:t>19</a:t>
-            </a:fld>
-            <a:endParaRPr lang="de-DE" dirty="0"/>
-          </a:p>
-        </p:txBody>
-      </p:sp>
-    </p:spTree>
-    <p:extLst>
-      <p:ext uri="{BB962C8B-B14F-4D97-AF65-F5344CB8AC3E}">
-        <p14:creationId xmlns:p14="http://schemas.microsoft.com/office/powerpoint/2010/main" val="810339624"/>
-      </p:ext>
-    </p:extLst>
-  </p:cSld>
-  <p:clrMapOvr>
-    <a:masterClrMapping/>
-  </p:clrMapOvr>
-</p:sld>
-</file>
-
 <file path=ppt/slides/slide2.xml><?xml version="1.0" encoding="utf-8"?>
 <p:sld xmlns:a="http://schemas.openxmlformats.org/drawingml/2006/main" xmlns:r="http://schemas.openxmlformats.org/officeDocument/2006/relationships" xmlns:p="http://schemas.openxmlformats.org/presentationml/2006/main">
   <p:cSld>
@@ -6599,6 +6674,167 @@
     <p:extLst>
       <p:ext uri="{BB962C8B-B14F-4D97-AF65-F5344CB8AC3E}">
         <p14:creationId xmlns:p14="http://schemas.microsoft.com/office/powerpoint/2010/main" val="4050885700"/>
+      </p:ext>
+    </p:extLst>
+  </p:cSld>
+  <p:clrMapOvr>
+    <a:masterClrMapping/>
+  </p:clrMapOvr>
+</p:sld>
+</file>
+
+<file path=ppt/slides/slide20.xml><?xml version="1.0" encoding="utf-8"?>
+<p:sld xmlns:a="http://schemas.openxmlformats.org/drawingml/2006/main" xmlns:r="http://schemas.openxmlformats.org/officeDocument/2006/relationships" xmlns:p="http://schemas.openxmlformats.org/presentationml/2006/main">
+  <p:cSld>
+    <p:spTree>
+      <p:nvGrpSpPr>
+        <p:cNvPr id="1" name=""/>
+        <p:cNvGrpSpPr/>
+        <p:nvPr/>
+      </p:nvGrpSpPr>
+      <p:grpSpPr>
+        <a:xfrm>
+          <a:off x="0" y="0"/>
+          <a:ext cx="0" cy="0"/>
+          <a:chOff x="0" y="0"/>
+          <a:chExt cx="0" cy="0"/>
+        </a:xfrm>
+      </p:grpSpPr>
+      <p:pic>
+        <p:nvPicPr>
+          <p:cNvPr id="8" name="Picture 7" descr="A screenshot of a social media post&#10;&#10;Description automatically generated">
+            <a:extLst>
+              <a:ext uri="{FF2B5EF4-FFF2-40B4-BE49-F238E27FC236}">
+                <a16:creationId xmlns:a16="http://schemas.microsoft.com/office/drawing/2014/main" id="{6FF1FBFC-E536-4965-9C90-D5AE9109D8E1}"/>
+              </a:ext>
+            </a:extLst>
+          </p:cNvPr>
+          <p:cNvPicPr>
+            <a:picLocks noChangeAspect="1"/>
+          </p:cNvPicPr>
+          <p:nvPr/>
+        </p:nvPicPr>
+        <p:blipFill>
+          <a:blip r:embed="rId2">
+            <a:extLst>
+              <a:ext uri="{28A0092B-C50C-407E-A947-70E740481C1C}">
+                <a14:useLocalDpi xmlns:a14="http://schemas.microsoft.com/office/drawing/2010/main" val="0"/>
+              </a:ext>
+            </a:extLst>
+          </a:blip>
+          <a:stretch>
+            <a:fillRect/>
+          </a:stretch>
+        </p:blipFill>
+        <p:spPr>
+          <a:xfrm>
+            <a:off x="838197" y="2489000"/>
+            <a:ext cx="11024864" cy="4104000"/>
+          </a:xfrm>
+          <a:prstGeom prst="rect">
+            <a:avLst/>
+          </a:prstGeom>
+        </p:spPr>
+      </p:pic>
+      <p:sp>
+        <p:nvSpPr>
+          <p:cNvPr id="2" name="Title 1">
+            <a:extLst>
+              <a:ext uri="{FF2B5EF4-FFF2-40B4-BE49-F238E27FC236}">
+                <a16:creationId xmlns:a16="http://schemas.microsoft.com/office/drawing/2014/main" id="{840336D5-8B75-40CA-B0C9-190D0E8F297B}"/>
+              </a:ext>
+            </a:extLst>
+          </p:cNvPr>
+          <p:cNvSpPr>
+            <a:spLocks noGrp="1"/>
+          </p:cNvSpPr>
+          <p:nvPr>
+            <p:ph type="title"/>
+          </p:nvPr>
+        </p:nvSpPr>
+        <p:spPr/>
+        <p:txBody>
+          <a:bodyPr/>
+          <a:lstStyle/>
+          <a:p>
+            <a:pPr algn="ctr"/>
+            <a:r>
+              <a:rPr lang="de-DE" dirty="0"/>
+              <a:t>Twitch Code</a:t>
+            </a:r>
+            <a:endParaRPr lang="en-GB" dirty="0"/>
+          </a:p>
+        </p:txBody>
+      </p:sp>
+      <p:sp>
+        <p:nvSpPr>
+          <p:cNvPr id="3" name="Content Placeholder 2">
+            <a:extLst>
+              <a:ext uri="{FF2B5EF4-FFF2-40B4-BE49-F238E27FC236}">
+                <a16:creationId xmlns:a16="http://schemas.microsoft.com/office/drawing/2014/main" id="{B9283830-3920-478C-9132-ADFC86ED846A}"/>
+              </a:ext>
+            </a:extLst>
+          </p:cNvPr>
+          <p:cNvSpPr>
+            <a:spLocks noGrp="1"/>
+          </p:cNvSpPr>
+          <p:nvPr>
+            <p:ph idx="1"/>
+          </p:nvPr>
+        </p:nvSpPr>
+        <p:spPr>
+          <a:xfrm>
+            <a:off x="838200" y="1825625"/>
+            <a:ext cx="10515600" cy="460375"/>
+          </a:xfrm>
+        </p:spPr>
+        <p:txBody>
+          <a:bodyPr>
+            <a:normAutofit lnSpcReduction="10000"/>
+          </a:bodyPr>
+          <a:lstStyle/>
+          <a:p>
+            <a:r>
+              <a:rPr lang="en-GB" dirty="0"/>
+              <a:t>Navigator</a:t>
+            </a:r>
+          </a:p>
+        </p:txBody>
+      </p:sp>
+      <p:sp>
+        <p:nvSpPr>
+          <p:cNvPr id="4" name="Slide Number Placeholder 3">
+            <a:extLst>
+              <a:ext uri="{FF2B5EF4-FFF2-40B4-BE49-F238E27FC236}">
+                <a16:creationId xmlns:a16="http://schemas.microsoft.com/office/drawing/2014/main" id="{5F3B4A6E-1EFA-40F3-B63D-6A2C956993B6}"/>
+              </a:ext>
+            </a:extLst>
+          </p:cNvPr>
+          <p:cNvSpPr>
+            <a:spLocks noGrp="1"/>
+          </p:cNvSpPr>
+          <p:nvPr>
+            <p:ph type="sldNum" sz="quarter" idx="12"/>
+          </p:nvPr>
+        </p:nvSpPr>
+        <p:spPr/>
+        <p:txBody>
+          <a:bodyPr/>
+          <a:lstStyle/>
+          <a:p>
+            <a:fld id="{5FA8D64E-092D-488F-9555-4FE258A6A447}" type="slidenum">
+              <a:rPr lang="de-DE" smtClean="0"/>
+              <a:pPr/>
+              <a:t>20</a:t>
+            </a:fld>
+            <a:endParaRPr lang="de-DE" dirty="0"/>
+          </a:p>
+        </p:txBody>
+      </p:sp>
+    </p:spTree>
+    <p:extLst>
+      <p:ext uri="{BB962C8B-B14F-4D97-AF65-F5344CB8AC3E}">
+        <p14:creationId xmlns:p14="http://schemas.microsoft.com/office/powerpoint/2010/main" val="810339624"/>
       </p:ext>
     </p:extLst>
   </p:cSld>

</xml_diff>

<commit_message>
o added animations and code examples from deliver
</commit_message>
<xml_diff>
--- a/projectPresentation/WatchOut Presentation.pptx
+++ b/projectPresentation/WatchOut Presentation.pptx
@@ -5,7 +5,7 @@
     <p:sldMasterId id="2147483648" r:id="rId1"/>
   </p:sldMasterIdLst>
   <p:notesMasterIdLst>
-    <p:notesMasterId r:id="rId22"/>
+    <p:notesMasterId r:id="rId30"/>
   </p:notesMasterIdLst>
   <p:sldIdLst>
     <p:sldId id="256" r:id="rId2"/>
@@ -21,13 +21,21 @@
     <p:sldId id="295" r:id="rId12"/>
     <p:sldId id="289" r:id="rId13"/>
     <p:sldId id="283" r:id="rId14"/>
-    <p:sldId id="291" r:id="rId15"/>
-    <p:sldId id="301" r:id="rId16"/>
+    <p:sldId id="301" r:id="rId15"/>
+    <p:sldId id="291" r:id="rId16"/>
     <p:sldId id="292" r:id="rId17"/>
     <p:sldId id="297" r:id="rId18"/>
     <p:sldId id="298" r:id="rId19"/>
     <p:sldId id="299" r:id="rId20"/>
     <p:sldId id="300" r:id="rId21"/>
+    <p:sldId id="307" r:id="rId22"/>
+    <p:sldId id="309" r:id="rId23"/>
+    <p:sldId id="310" r:id="rId24"/>
+    <p:sldId id="302" r:id="rId25"/>
+    <p:sldId id="303" r:id="rId26"/>
+    <p:sldId id="308" r:id="rId27"/>
+    <p:sldId id="305" r:id="rId28"/>
+    <p:sldId id="306" r:id="rId29"/>
   </p:sldIdLst>
   <p:sldSz cx="12192000" cy="6858000"/>
   <p:notesSz cx="6858000" cy="9144000"/>
@@ -5021,7 +5029,7 @@
           <p:cNvPr id="2" name="Title 1">
             <a:extLst>
               <a:ext uri="{FF2B5EF4-FFF2-40B4-BE49-F238E27FC236}">
-                <a16:creationId xmlns:a16="http://schemas.microsoft.com/office/drawing/2014/main" id="{6092F721-B83E-4186-B231-369E6CD0D635}"/>
+                <a16:creationId xmlns:a16="http://schemas.microsoft.com/office/drawing/2014/main" id="{3FA7DF47-F845-4251-BD28-7B4C341FD651}"/>
               </a:ext>
             </a:extLst>
           </p:cNvPr>
@@ -5040,8 +5048,21 @@
             <a:pPr algn="ctr"/>
             <a:r>
               <a:rPr lang="de-DE" dirty="0"/>
-              <a:t>Problems</a:t>
-            </a:r>
+              <a:t>Additional </a:t>
+            </a:r>
+            <a:r>
+              <a:rPr lang="de-DE" dirty="0" err="1"/>
+              <a:t>ideas</a:t>
+            </a:r>
+            <a:r>
+              <a:rPr lang="de-DE" dirty="0"/>
+              <a:t> &amp; </a:t>
+            </a:r>
+            <a:r>
+              <a:rPr lang="de-DE" dirty="0" err="1"/>
+              <a:t>changes</a:t>
+            </a:r>
+            <a:endParaRPr lang="en-GB" dirty="0"/>
           </a:p>
         </p:txBody>
       </p:sp>
@@ -5050,7 +5071,7 @@
           <p:cNvPr id="3" name="Content Placeholder 2">
             <a:extLst>
               <a:ext uri="{FF2B5EF4-FFF2-40B4-BE49-F238E27FC236}">
-                <a16:creationId xmlns:a16="http://schemas.microsoft.com/office/drawing/2014/main" id="{3C54E6E1-CF08-4325-A1C6-C4FFDF5DF6D0}"/>
+                <a16:creationId xmlns:a16="http://schemas.microsoft.com/office/drawing/2014/main" id="{5B71D88D-2510-42D2-82EE-9363D00EF2B9}"/>
               </a:ext>
             </a:extLst>
           </p:cNvPr>
@@ -5061,144 +5082,127 @@
             <p:ph idx="1"/>
           </p:nvPr>
         </p:nvSpPr>
-        <p:spPr/>
-        <p:txBody>
-          <a:bodyPr/>
-          <a:lstStyle/>
-          <a:p>
-            <a:r>
-              <a:rPr lang="de-DE" dirty="0" err="1"/>
-              <a:t>One</a:t>
-            </a:r>
-            <a:r>
-              <a:rPr lang="de-DE" dirty="0"/>
-              <a:t> iPhone and </a:t>
-            </a:r>
-            <a:r>
-              <a:rPr lang="de-DE" dirty="0" err="1"/>
-              <a:t>macbook</a:t>
-            </a:r>
+        <p:spPr>
+          <a:xfrm>
+            <a:off x="838200" y="1825625"/>
+            <a:ext cx="10515600" cy="4351338"/>
+          </a:xfrm>
+        </p:spPr>
+        <p:txBody>
+          <a:bodyPr>
+            <a:normAutofit fontScale="92500" lnSpcReduction="10000"/>
+          </a:bodyPr>
+          <a:lstStyle/>
+          <a:p>
+            <a:r>
+              <a:rPr lang="de-DE" dirty="0"/>
+              <a:t>More </a:t>
+            </a:r>
+            <a:r>
+              <a:rPr lang="de-DE" dirty="0" err="1"/>
+              <a:t>task</a:t>
+            </a:r>
+            <a:r>
+              <a:rPr lang="en-GB" dirty="0"/>
+              <a:t>s	</a:t>
+            </a:r>
+          </a:p>
+          <a:p>
+            <a:pPr lvl="1"/>
+            <a:r>
+              <a:rPr lang="en-GB" dirty="0"/>
+              <a:t>Knock Rhythm with help of Sound recording</a:t>
+            </a:r>
+          </a:p>
+          <a:p>
+            <a:pPr lvl="1"/>
+            <a:r>
+              <a:rPr lang="en-GB" dirty="0"/>
+              <a:t>Count Shakes</a:t>
+            </a:r>
+          </a:p>
+          <a:p>
+            <a:pPr lvl="1"/>
+            <a:r>
+              <a:rPr lang="en-GB" dirty="0"/>
+              <a:t>Ball balance</a:t>
+            </a:r>
+          </a:p>
+          <a:p>
+            <a:r>
+              <a:rPr lang="en-GB" dirty="0" err="1"/>
+              <a:t>Highscore</a:t>
+            </a:r>
+            <a:r>
+              <a:rPr lang="en-GB" dirty="0"/>
+              <a:t> for Players</a:t>
+            </a:r>
+          </a:p>
+          <a:p>
+            <a:r>
+              <a:rPr lang="en-GB" dirty="0"/>
+              <a:t>Better unwrap Directions of Use</a:t>
+            </a:r>
+          </a:p>
+          <a:p>
+            <a:r>
+              <a:rPr lang="en-GB" dirty="0"/>
+              <a:t>More Twitch Directions of Movement</a:t>
+            </a:r>
+          </a:p>
+          <a:p>
+            <a:r>
+              <a:rPr lang="en-GB" dirty="0"/>
+              <a:t>Better UI</a:t>
+            </a:r>
+          </a:p>
+          <a:p>
+            <a:r>
+              <a:rPr lang="en-GB" dirty="0"/>
+              <a:t>Structure of program</a:t>
+            </a:r>
+          </a:p>
+          <a:p>
+            <a:pPr lvl="1"/>
+            <a:r>
+              <a:rPr lang="en-GB" dirty="0"/>
+              <a:t>More Abstraction</a:t>
+            </a:r>
+          </a:p>
+          <a:p>
+            <a:pPr lvl="1"/>
+            <a:r>
+              <a:rPr lang="en-GB" dirty="0"/>
+              <a:t>More polymorphism</a:t>
+            </a:r>
+          </a:p>
+          <a:p>
+            <a:endParaRPr lang="en-GB" dirty="0"/>
+          </a:p>
+          <a:p>
+            <a:pPr lvl="1"/>
+            <a:endParaRPr lang="en-GB" dirty="0"/>
+          </a:p>
+          <a:p>
+            <a:pPr lvl="2"/>
+            <a:endParaRPr lang="en-GB" dirty="0"/>
+          </a:p>
+          <a:p>
+            <a:pPr lvl="1"/>
+            <a:endParaRPr lang="en-GB" dirty="0"/>
+          </a:p>
+          <a:p>
+            <a:pPr lvl="2"/>
+            <a:endParaRPr lang="en-GB" dirty="0"/>
+          </a:p>
+          <a:p>
+            <a:pPr lvl="1"/>
+            <a:endParaRPr lang="en-GB" dirty="0"/>
+          </a:p>
+          <a:p>
+            <a:pPr lvl="1"/>
             <a:endParaRPr lang="de-DE" dirty="0"/>
           </a:p>
-          <a:p>
-            <a:r>
-              <a:rPr lang="de-DE" dirty="0" err="1"/>
-              <a:t>Github</a:t>
-            </a:r>
-            <a:r>
-              <a:rPr lang="de-DE" dirty="0"/>
-              <a:t> </a:t>
-            </a:r>
-            <a:r>
-              <a:rPr lang="de-DE" dirty="0" err="1"/>
-              <a:t>merge</a:t>
-            </a:r>
-            <a:r>
-              <a:rPr lang="de-DE" dirty="0"/>
-              <a:t> </a:t>
-            </a:r>
-            <a:r>
-              <a:rPr lang="de-DE" dirty="0" err="1"/>
-              <a:t>of</a:t>
-            </a:r>
-            <a:r>
-              <a:rPr lang="de-DE" dirty="0"/>
-              <a:t> </a:t>
-            </a:r>
-            <a:r>
-              <a:rPr lang="de-DE" dirty="0" err="1"/>
-              <a:t>main.storyboard</a:t>
-            </a:r>
-            <a:endParaRPr lang="de-DE" dirty="0"/>
-          </a:p>
-          <a:p>
-            <a:r>
-              <a:rPr lang="de-DE" dirty="0" err="1"/>
-              <a:t>rbi-room</a:t>
-            </a:r>
-            <a:r>
-              <a:rPr lang="de-DE" dirty="0"/>
-              <a:t> </a:t>
-            </a:r>
-            <a:r>
-              <a:rPr lang="de-DE" dirty="0" err="1"/>
-              <a:t>is</a:t>
-            </a:r>
-            <a:r>
-              <a:rPr lang="de-DE" dirty="0"/>
-              <a:t> not </a:t>
-            </a:r>
-            <a:r>
-              <a:rPr lang="de-DE" dirty="0" err="1"/>
-              <a:t>always</a:t>
-            </a:r>
-            <a:r>
-              <a:rPr lang="de-DE" dirty="0"/>
-              <a:t> </a:t>
-            </a:r>
-            <a:r>
-              <a:rPr lang="de-DE" dirty="0" err="1"/>
-              <a:t>available</a:t>
-            </a:r>
-            <a:endParaRPr lang="de-DE" dirty="0"/>
-          </a:p>
-          <a:p>
-            <a:r>
-              <a:rPr lang="de-DE" dirty="0"/>
-              <a:t>Start </a:t>
-            </a:r>
-            <a:r>
-              <a:rPr lang="de-DE" dirty="0" err="1"/>
-              <a:t>earlier</a:t>
-            </a:r>
-            <a:r>
-              <a:rPr lang="de-DE" dirty="0"/>
-              <a:t> (</a:t>
-            </a:r>
-            <a:r>
-              <a:rPr lang="de-DE" dirty="0" err="1"/>
-              <a:t>especially</a:t>
-            </a:r>
-            <a:r>
-              <a:rPr lang="de-DE" dirty="0"/>
-              <a:t> </a:t>
-            </a:r>
-            <a:r>
-              <a:rPr lang="de-DE" dirty="0" err="1"/>
-              <a:t>when</a:t>
-            </a:r>
-            <a:r>
-              <a:rPr lang="de-DE" dirty="0"/>
-              <a:t> </a:t>
-            </a:r>
-            <a:r>
-              <a:rPr lang="de-DE" dirty="0" err="1"/>
-              <a:t>researching</a:t>
-            </a:r>
-            <a:r>
-              <a:rPr lang="de-DE" dirty="0"/>
-              <a:t> </a:t>
-            </a:r>
-            <a:r>
-              <a:rPr lang="de-DE" dirty="0" err="1"/>
-              <a:t>the</a:t>
-            </a:r>
-            <a:r>
-              <a:rPr lang="de-DE" dirty="0"/>
-              <a:t> </a:t>
-            </a:r>
-            <a:r>
-              <a:rPr lang="de-DE" dirty="0" err="1"/>
-              <a:t>frameworks</a:t>
-            </a:r>
-            <a:r>
-              <a:rPr lang="de-DE" dirty="0"/>
-              <a:t>)</a:t>
-            </a:r>
-          </a:p>
-          <a:p>
-            <a:endParaRPr lang="de-DE" dirty="0"/>
-          </a:p>
         </p:txBody>
       </p:sp>
       <p:sp>
@@ -5206,7 +5210,7 @@
           <p:cNvPr id="4" name="Slide Number Placeholder 3">
             <a:extLst>
               <a:ext uri="{FF2B5EF4-FFF2-40B4-BE49-F238E27FC236}">
-                <a16:creationId xmlns:a16="http://schemas.microsoft.com/office/drawing/2014/main" id="{F248A981-A00B-437E-87B4-9A6490C6B3E5}"/>
+                <a16:creationId xmlns:a16="http://schemas.microsoft.com/office/drawing/2014/main" id="{5FBC4890-7A13-450E-9EFB-CCDFFFA05B48}"/>
               </a:ext>
             </a:extLst>
           </p:cNvPr>
@@ -5234,7 +5238,7 @@
     </p:spTree>
     <p:extLst>
       <p:ext uri="{BB962C8B-B14F-4D97-AF65-F5344CB8AC3E}">
-        <p14:creationId xmlns:p14="http://schemas.microsoft.com/office/powerpoint/2010/main" val="2249742481"/>
+        <p14:creationId xmlns:p14="http://schemas.microsoft.com/office/powerpoint/2010/main" val="394130377"/>
       </p:ext>
     </p:extLst>
   </p:cSld>
@@ -5266,7 +5270,7 @@
           <p:cNvPr id="2" name="Title 1">
             <a:extLst>
               <a:ext uri="{FF2B5EF4-FFF2-40B4-BE49-F238E27FC236}">
-                <a16:creationId xmlns:a16="http://schemas.microsoft.com/office/drawing/2014/main" id="{3FA7DF47-F845-4251-BD28-7B4C341FD651}"/>
+                <a16:creationId xmlns:a16="http://schemas.microsoft.com/office/drawing/2014/main" id="{6092F721-B83E-4186-B231-369E6CD0D635}"/>
               </a:ext>
             </a:extLst>
           </p:cNvPr>
@@ -5285,21 +5289,8 @@
             <a:pPr algn="ctr"/>
             <a:r>
               <a:rPr lang="de-DE" dirty="0"/>
-              <a:t>Additional </a:t>
-            </a:r>
-            <a:r>
-              <a:rPr lang="de-DE" dirty="0" err="1"/>
-              <a:t>ideas</a:t>
-            </a:r>
-            <a:r>
-              <a:rPr lang="de-DE" dirty="0"/>
-              <a:t> &amp; </a:t>
-            </a:r>
-            <a:r>
-              <a:rPr lang="de-DE" dirty="0" err="1"/>
-              <a:t>changes</a:t>
-            </a:r>
-            <a:endParaRPr lang="en-GB" dirty="0"/>
+              <a:t>Problems</a:t>
+            </a:r>
           </a:p>
         </p:txBody>
       </p:sp>
@@ -5308,7 +5299,7 @@
           <p:cNvPr id="3" name="Content Placeholder 2">
             <a:extLst>
               <a:ext uri="{FF2B5EF4-FFF2-40B4-BE49-F238E27FC236}">
-                <a16:creationId xmlns:a16="http://schemas.microsoft.com/office/drawing/2014/main" id="{5B71D88D-2510-42D2-82EE-9363D00EF2B9}"/>
+                <a16:creationId xmlns:a16="http://schemas.microsoft.com/office/drawing/2014/main" id="{3C54E6E1-CF08-4325-A1C6-C4FFDF5DF6D0}"/>
               </a:ext>
             </a:extLst>
           </p:cNvPr>
@@ -5319,121 +5310,144 @@
             <p:ph idx="1"/>
           </p:nvPr>
         </p:nvSpPr>
-        <p:spPr>
-          <a:xfrm>
-            <a:off x="838200" y="1825625"/>
-            <a:ext cx="10515600" cy="4351338"/>
-          </a:xfrm>
-        </p:spPr>
-        <p:txBody>
-          <a:bodyPr>
-            <a:normAutofit lnSpcReduction="10000"/>
-          </a:bodyPr>
-          <a:lstStyle/>
-          <a:p>
-            <a:r>
-              <a:rPr lang="de-DE" dirty="0"/>
-              <a:t>More </a:t>
-            </a:r>
-            <a:r>
-              <a:rPr lang="de-DE" dirty="0" err="1"/>
-              <a:t>task</a:t>
-            </a:r>
-            <a:r>
-              <a:rPr lang="en-GB" dirty="0"/>
-              <a:t>s	</a:t>
-            </a:r>
-          </a:p>
-          <a:p>
-            <a:pPr lvl="1"/>
-            <a:r>
-              <a:rPr lang="en-GB" dirty="0"/>
-              <a:t>Knock Rhythm with help of Sound recording</a:t>
-            </a:r>
-          </a:p>
-          <a:p>
-            <a:pPr lvl="1"/>
-            <a:r>
-              <a:rPr lang="en-GB" dirty="0"/>
-              <a:t>Count Shakes</a:t>
-            </a:r>
-          </a:p>
-          <a:p>
-            <a:pPr lvl="1"/>
-            <a:r>
-              <a:rPr lang="en-GB" dirty="0"/>
-              <a:t>Ball balance</a:t>
-            </a:r>
-          </a:p>
-          <a:p>
-            <a:r>
-              <a:rPr lang="en-GB" dirty="0" err="1"/>
-              <a:t>Highscore</a:t>
-            </a:r>
-            <a:r>
-              <a:rPr lang="en-GB" dirty="0"/>
-              <a:t> for Players</a:t>
-            </a:r>
-          </a:p>
-          <a:p>
-            <a:r>
-              <a:rPr lang="en-GB" dirty="0"/>
-              <a:t>Better unwrap Directions of Use</a:t>
-            </a:r>
-          </a:p>
-          <a:p>
-            <a:r>
-              <a:rPr lang="en-GB" dirty="0"/>
-              <a:t>More Twitch Directions of Movement</a:t>
-            </a:r>
-          </a:p>
-          <a:p>
-            <a:r>
-              <a:rPr lang="en-GB" dirty="0"/>
-              <a:t>Structure of program</a:t>
-            </a:r>
-          </a:p>
-          <a:p>
-            <a:pPr lvl="1"/>
-            <a:r>
-              <a:rPr lang="en-GB" dirty="0"/>
-              <a:t>More Abstraction</a:t>
-            </a:r>
-          </a:p>
-          <a:p>
-            <a:pPr lvl="1"/>
-            <a:r>
-              <a:rPr lang="en-GB" dirty="0"/>
-              <a:t>More polymorphism</a:t>
-            </a:r>
-          </a:p>
-          <a:p>
-            <a:endParaRPr lang="en-GB" dirty="0"/>
-          </a:p>
-          <a:p>
-            <a:pPr lvl="1"/>
-            <a:endParaRPr lang="en-GB" dirty="0"/>
-          </a:p>
-          <a:p>
-            <a:pPr lvl="2"/>
-            <a:endParaRPr lang="en-GB" dirty="0"/>
-          </a:p>
-          <a:p>
-            <a:pPr lvl="1"/>
-            <a:endParaRPr lang="en-GB" dirty="0"/>
-          </a:p>
-          <a:p>
-            <a:pPr lvl="2"/>
-            <a:endParaRPr lang="en-GB" dirty="0"/>
-          </a:p>
-          <a:p>
-            <a:pPr lvl="1"/>
-            <a:endParaRPr lang="en-GB" dirty="0"/>
-          </a:p>
-          <a:p>
-            <a:pPr lvl="1"/>
+        <p:spPr/>
+        <p:txBody>
+          <a:bodyPr/>
+          <a:lstStyle/>
+          <a:p>
+            <a:r>
+              <a:rPr lang="de-DE" dirty="0" err="1"/>
+              <a:t>One</a:t>
+            </a:r>
+            <a:r>
+              <a:rPr lang="de-DE" dirty="0"/>
+              <a:t> iPhone and </a:t>
+            </a:r>
+            <a:r>
+              <a:rPr lang="de-DE" dirty="0" err="1"/>
+              <a:t>macbook</a:t>
+            </a:r>
             <a:endParaRPr lang="de-DE" dirty="0"/>
           </a:p>
+          <a:p>
+            <a:r>
+              <a:rPr lang="de-DE" dirty="0" err="1"/>
+              <a:t>Github</a:t>
+            </a:r>
+            <a:r>
+              <a:rPr lang="de-DE" dirty="0"/>
+              <a:t> </a:t>
+            </a:r>
+            <a:r>
+              <a:rPr lang="de-DE" dirty="0" err="1"/>
+              <a:t>merge</a:t>
+            </a:r>
+            <a:r>
+              <a:rPr lang="de-DE" dirty="0"/>
+              <a:t> </a:t>
+            </a:r>
+            <a:r>
+              <a:rPr lang="de-DE" dirty="0" err="1"/>
+              <a:t>of</a:t>
+            </a:r>
+            <a:r>
+              <a:rPr lang="de-DE" dirty="0"/>
+              <a:t> </a:t>
+            </a:r>
+            <a:r>
+              <a:rPr lang="de-DE" dirty="0" err="1"/>
+              <a:t>main.storyboard</a:t>
+            </a:r>
+            <a:endParaRPr lang="de-DE" dirty="0"/>
+          </a:p>
+          <a:p>
+            <a:r>
+              <a:rPr lang="de-DE" dirty="0" err="1"/>
+              <a:t>rbi-room</a:t>
+            </a:r>
+            <a:r>
+              <a:rPr lang="de-DE" dirty="0"/>
+              <a:t> </a:t>
+            </a:r>
+            <a:r>
+              <a:rPr lang="de-DE" dirty="0" err="1"/>
+              <a:t>is</a:t>
+            </a:r>
+            <a:r>
+              <a:rPr lang="de-DE" dirty="0"/>
+              <a:t> not </a:t>
+            </a:r>
+            <a:r>
+              <a:rPr lang="de-DE" dirty="0" err="1"/>
+              <a:t>always</a:t>
+            </a:r>
+            <a:r>
+              <a:rPr lang="de-DE" dirty="0"/>
+              <a:t> </a:t>
+            </a:r>
+            <a:r>
+              <a:rPr lang="de-DE" dirty="0" err="1"/>
+              <a:t>available</a:t>
+            </a:r>
+            <a:endParaRPr lang="de-DE" dirty="0"/>
+          </a:p>
+          <a:p>
+            <a:r>
+              <a:rPr lang="de-DE" dirty="0"/>
+              <a:t>Start </a:t>
+            </a:r>
+            <a:r>
+              <a:rPr lang="de-DE" dirty="0" err="1"/>
+              <a:t>earlier</a:t>
+            </a:r>
+            <a:r>
+              <a:rPr lang="de-DE" dirty="0"/>
+              <a:t> (</a:t>
+            </a:r>
+            <a:r>
+              <a:rPr lang="de-DE" dirty="0" err="1"/>
+              <a:t>especially</a:t>
+            </a:r>
+            <a:r>
+              <a:rPr lang="de-DE" dirty="0"/>
+              <a:t> </a:t>
+            </a:r>
+            <a:r>
+              <a:rPr lang="de-DE" dirty="0" err="1"/>
+              <a:t>when</a:t>
+            </a:r>
+            <a:r>
+              <a:rPr lang="de-DE" dirty="0"/>
+              <a:t> </a:t>
+            </a:r>
+            <a:r>
+              <a:rPr lang="de-DE" dirty="0" err="1"/>
+              <a:t>researching</a:t>
+            </a:r>
+            <a:r>
+              <a:rPr lang="de-DE" dirty="0"/>
+              <a:t> </a:t>
+            </a:r>
+            <a:r>
+              <a:rPr lang="de-DE" dirty="0" err="1"/>
+              <a:t>the</a:t>
+            </a:r>
+            <a:r>
+              <a:rPr lang="de-DE" dirty="0"/>
+              <a:t> </a:t>
+            </a:r>
+            <a:r>
+              <a:rPr lang="de-DE" dirty="0" err="1"/>
+              <a:t>frameworks</a:t>
+            </a:r>
+            <a:r>
+              <a:rPr lang="de-DE" dirty="0"/>
+              <a:t>)</a:t>
+            </a:r>
+          </a:p>
+          <a:p>
+            <a:endParaRPr lang="de-DE" dirty="0"/>
+          </a:p>
         </p:txBody>
       </p:sp>
       <p:sp>
@@ -5441,7 +5455,7 @@
           <p:cNvPr id="4" name="Slide Number Placeholder 3">
             <a:extLst>
               <a:ext uri="{FF2B5EF4-FFF2-40B4-BE49-F238E27FC236}">
-                <a16:creationId xmlns:a16="http://schemas.microsoft.com/office/drawing/2014/main" id="{5FBC4890-7A13-450E-9EFB-CCDFFFA05B48}"/>
+                <a16:creationId xmlns:a16="http://schemas.microsoft.com/office/drawing/2014/main" id="{F248A981-A00B-437E-87B4-9A6490C6B3E5}"/>
               </a:ext>
             </a:extLst>
           </p:cNvPr>
@@ -5469,7 +5483,7 @@
     </p:spTree>
     <p:extLst>
       <p:ext uri="{BB962C8B-B14F-4D97-AF65-F5344CB8AC3E}">
-        <p14:creationId xmlns:p14="http://schemas.microsoft.com/office/powerpoint/2010/main" val="394130377"/>
+        <p14:creationId xmlns:p14="http://schemas.microsoft.com/office/powerpoint/2010/main" val="2249742481"/>
       </p:ext>
     </p:extLst>
   </p:cSld>
@@ -5512,7 +5526,12 @@
             <p:ph type="title"/>
           </p:nvPr>
         </p:nvSpPr>
-        <p:spPr/>
+        <p:spPr>
+          <a:xfrm>
+            <a:off x="838200" y="2766218"/>
+            <a:ext cx="10515600" cy="1325563"/>
+          </a:xfrm>
+        </p:spPr>
         <p:txBody>
           <a:bodyPr/>
           <a:lstStyle/>
@@ -5521,53 +5540,6 @@
             <a:r>
               <a:rPr lang="en-GB" dirty="0"/>
               <a:t>Code examples</a:t>
-            </a:r>
-            <a:endParaRPr lang="de-DE" dirty="0"/>
-          </a:p>
-        </p:txBody>
-      </p:sp>
-      <p:sp>
-        <p:nvSpPr>
-          <p:cNvPr id="3" name="Content Placeholder 2">
-            <a:extLst>
-              <a:ext uri="{FF2B5EF4-FFF2-40B4-BE49-F238E27FC236}">
-                <a16:creationId xmlns:a16="http://schemas.microsoft.com/office/drawing/2014/main" id="{688DDCCC-3442-4F95-AD39-7A5E7E906537}"/>
-              </a:ext>
-            </a:extLst>
-          </p:cNvPr>
-          <p:cNvSpPr>
-            <a:spLocks noGrp="1"/>
-          </p:cNvSpPr>
-          <p:nvPr>
-            <p:ph idx="1"/>
-          </p:nvPr>
-        </p:nvSpPr>
-        <p:spPr/>
-        <p:txBody>
-          <a:bodyPr/>
-          <a:lstStyle/>
-          <a:p>
-            <a:r>
-              <a:rPr lang="en-GB" dirty="0"/>
-              <a:t>Twitch</a:t>
-            </a:r>
-          </a:p>
-          <a:p>
-            <a:r>
-              <a:rPr lang="en-GB" dirty="0"/>
-              <a:t>Light manager</a:t>
-            </a:r>
-          </a:p>
-          <a:p>
-            <a:r>
-              <a:rPr lang="en-GB" dirty="0"/>
-              <a:t>Unwrap</a:t>
-            </a:r>
-          </a:p>
-          <a:p>
-            <a:r>
-              <a:rPr lang="en-GB" dirty="0"/>
-              <a:t>Deliver</a:t>
             </a:r>
             <a:endParaRPr lang="de-DE" dirty="0"/>
           </a:p>
@@ -6680,6 +6652,321 @@
   <p:clrMapOvr>
     <a:masterClrMapping/>
   </p:clrMapOvr>
+  <p:timing>
+    <p:tnLst>
+      <p:par>
+        <p:cTn id="1" dur="indefinite" restart="never" nodeType="tmRoot">
+          <p:childTnLst>
+            <p:seq concurrent="1" nextAc="seek">
+              <p:cTn id="2" dur="indefinite" nodeType="mainSeq">
+                <p:childTnLst>
+                  <p:par>
+                    <p:cTn id="3" fill="hold">
+                      <p:stCondLst>
+                        <p:cond delay="indefinite"/>
+                      </p:stCondLst>
+                      <p:childTnLst>
+                        <p:par>
+                          <p:cTn id="4" fill="hold">
+                            <p:stCondLst>
+                              <p:cond delay="0"/>
+                            </p:stCondLst>
+                            <p:childTnLst>
+                              <p:par>
+                                <p:cTn id="5" presetID="1" presetClass="entr" presetSubtype="0" fill="hold" nodeType="clickEffect">
+                                  <p:stCondLst>
+                                    <p:cond delay="0"/>
+                                  </p:stCondLst>
+                                  <p:childTnLst>
+                                    <p:set>
+                                      <p:cBhvr>
+                                        <p:cTn id="6" dur="1" fill="hold">
+                                          <p:stCondLst>
+                                            <p:cond delay="0"/>
+                                          </p:stCondLst>
+                                        </p:cTn>
+                                        <p:tgtEl>
+                                          <p:spTgt spid="3">
+                                            <p:txEl>
+                                              <p:pRg st="2" end="2"/>
+                                            </p:txEl>
+                                          </p:spTgt>
+                                        </p:tgtEl>
+                                        <p:attrNameLst>
+                                          <p:attrName>style.visibility</p:attrName>
+                                        </p:attrNameLst>
+                                      </p:cBhvr>
+                                      <p:to>
+                                        <p:strVal val="visible"/>
+                                      </p:to>
+                                    </p:set>
+                                  </p:childTnLst>
+                                </p:cTn>
+                              </p:par>
+                            </p:childTnLst>
+                          </p:cTn>
+                        </p:par>
+                      </p:childTnLst>
+                    </p:cTn>
+                  </p:par>
+                  <p:par>
+                    <p:cTn id="7" fill="hold">
+                      <p:stCondLst>
+                        <p:cond delay="indefinite"/>
+                      </p:stCondLst>
+                      <p:childTnLst>
+                        <p:par>
+                          <p:cTn id="8" fill="hold">
+                            <p:stCondLst>
+                              <p:cond delay="0"/>
+                            </p:stCondLst>
+                            <p:childTnLst>
+                              <p:par>
+                                <p:cTn id="9" presetID="1" presetClass="entr" presetSubtype="0" fill="hold" nodeType="clickEffect">
+                                  <p:stCondLst>
+                                    <p:cond delay="0"/>
+                                  </p:stCondLst>
+                                  <p:childTnLst>
+                                    <p:set>
+                                      <p:cBhvr>
+                                        <p:cTn id="10" dur="1" fill="hold">
+                                          <p:stCondLst>
+                                            <p:cond delay="0"/>
+                                          </p:stCondLst>
+                                        </p:cTn>
+                                        <p:tgtEl>
+                                          <p:spTgt spid="3">
+                                            <p:txEl>
+                                              <p:pRg st="3" end="3"/>
+                                            </p:txEl>
+                                          </p:spTgt>
+                                        </p:tgtEl>
+                                        <p:attrNameLst>
+                                          <p:attrName>style.visibility</p:attrName>
+                                        </p:attrNameLst>
+                                      </p:cBhvr>
+                                      <p:to>
+                                        <p:strVal val="visible"/>
+                                      </p:to>
+                                    </p:set>
+                                  </p:childTnLst>
+                                </p:cTn>
+                              </p:par>
+                            </p:childTnLst>
+                          </p:cTn>
+                        </p:par>
+                      </p:childTnLst>
+                    </p:cTn>
+                  </p:par>
+                  <p:par>
+                    <p:cTn id="11" fill="hold">
+                      <p:stCondLst>
+                        <p:cond delay="indefinite"/>
+                      </p:stCondLst>
+                      <p:childTnLst>
+                        <p:par>
+                          <p:cTn id="12" fill="hold">
+                            <p:stCondLst>
+                              <p:cond delay="0"/>
+                            </p:stCondLst>
+                            <p:childTnLst>
+                              <p:par>
+                                <p:cTn id="13" presetID="1" presetClass="entr" presetSubtype="0" fill="hold" nodeType="clickEffect">
+                                  <p:stCondLst>
+                                    <p:cond delay="0"/>
+                                  </p:stCondLst>
+                                  <p:childTnLst>
+                                    <p:set>
+                                      <p:cBhvr>
+                                        <p:cTn id="14" dur="1" fill="hold">
+                                          <p:stCondLst>
+                                            <p:cond delay="0"/>
+                                          </p:stCondLst>
+                                        </p:cTn>
+                                        <p:tgtEl>
+                                          <p:spTgt spid="3">
+                                            <p:txEl>
+                                              <p:pRg st="4" end="4"/>
+                                            </p:txEl>
+                                          </p:spTgt>
+                                        </p:tgtEl>
+                                        <p:attrNameLst>
+                                          <p:attrName>style.visibility</p:attrName>
+                                        </p:attrNameLst>
+                                      </p:cBhvr>
+                                      <p:to>
+                                        <p:strVal val="visible"/>
+                                      </p:to>
+                                    </p:set>
+                                  </p:childTnLst>
+                                </p:cTn>
+                              </p:par>
+                              <p:par>
+                                <p:cTn id="15" presetID="1" presetClass="entr" presetSubtype="0" fill="hold" nodeType="withEffect">
+                                  <p:stCondLst>
+                                    <p:cond delay="0"/>
+                                  </p:stCondLst>
+                                  <p:childTnLst>
+                                    <p:set>
+                                      <p:cBhvr>
+                                        <p:cTn id="16" dur="1" fill="hold">
+                                          <p:stCondLst>
+                                            <p:cond delay="0"/>
+                                          </p:stCondLst>
+                                        </p:cTn>
+                                        <p:tgtEl>
+                                          <p:spTgt spid="3">
+                                            <p:txEl>
+                                              <p:pRg st="5" end="5"/>
+                                            </p:txEl>
+                                          </p:spTgt>
+                                        </p:tgtEl>
+                                        <p:attrNameLst>
+                                          <p:attrName>style.visibility</p:attrName>
+                                        </p:attrNameLst>
+                                      </p:cBhvr>
+                                      <p:to>
+                                        <p:strVal val="visible"/>
+                                      </p:to>
+                                    </p:set>
+                                  </p:childTnLst>
+                                </p:cTn>
+                              </p:par>
+                              <p:par>
+                                <p:cTn id="17" presetID="1" presetClass="entr" presetSubtype="0" fill="hold" nodeType="withEffect">
+                                  <p:stCondLst>
+                                    <p:cond delay="0"/>
+                                  </p:stCondLst>
+                                  <p:childTnLst>
+                                    <p:set>
+                                      <p:cBhvr>
+                                        <p:cTn id="18" dur="1" fill="hold">
+                                          <p:stCondLst>
+                                            <p:cond delay="0"/>
+                                          </p:stCondLst>
+                                        </p:cTn>
+                                        <p:tgtEl>
+                                          <p:spTgt spid="3">
+                                            <p:txEl>
+                                              <p:pRg st="6" end="6"/>
+                                            </p:txEl>
+                                          </p:spTgt>
+                                        </p:tgtEl>
+                                        <p:attrNameLst>
+                                          <p:attrName>style.visibility</p:attrName>
+                                        </p:attrNameLst>
+                                      </p:cBhvr>
+                                      <p:to>
+                                        <p:strVal val="visible"/>
+                                      </p:to>
+                                    </p:set>
+                                  </p:childTnLst>
+                                </p:cTn>
+                              </p:par>
+                              <p:par>
+                                <p:cTn id="19" presetID="1" presetClass="entr" presetSubtype="0" fill="hold" nodeType="withEffect">
+                                  <p:stCondLst>
+                                    <p:cond delay="0"/>
+                                  </p:stCondLst>
+                                  <p:childTnLst>
+                                    <p:set>
+                                      <p:cBhvr>
+                                        <p:cTn id="20" dur="1" fill="hold">
+                                          <p:stCondLst>
+                                            <p:cond delay="0"/>
+                                          </p:stCondLst>
+                                        </p:cTn>
+                                        <p:tgtEl>
+                                          <p:spTgt spid="3">
+                                            <p:txEl>
+                                              <p:pRg st="7" end="7"/>
+                                            </p:txEl>
+                                          </p:spTgt>
+                                        </p:tgtEl>
+                                        <p:attrNameLst>
+                                          <p:attrName>style.visibility</p:attrName>
+                                        </p:attrNameLst>
+                                      </p:cBhvr>
+                                      <p:to>
+                                        <p:strVal val="visible"/>
+                                      </p:to>
+                                    </p:set>
+                                  </p:childTnLst>
+                                </p:cTn>
+                              </p:par>
+                            </p:childTnLst>
+                          </p:cTn>
+                        </p:par>
+                      </p:childTnLst>
+                    </p:cTn>
+                  </p:par>
+                  <p:par>
+                    <p:cTn id="21" fill="hold">
+                      <p:stCondLst>
+                        <p:cond delay="indefinite"/>
+                      </p:stCondLst>
+                      <p:childTnLst>
+                        <p:par>
+                          <p:cTn id="22" fill="hold">
+                            <p:stCondLst>
+                              <p:cond delay="0"/>
+                            </p:stCondLst>
+                            <p:childTnLst>
+                              <p:par>
+                                <p:cTn id="23" presetID="1" presetClass="entr" presetSubtype="0" fill="hold" nodeType="clickEffect">
+                                  <p:stCondLst>
+                                    <p:cond delay="0"/>
+                                  </p:stCondLst>
+                                  <p:childTnLst>
+                                    <p:set>
+                                      <p:cBhvr>
+                                        <p:cTn id="24" dur="1" fill="hold">
+                                          <p:stCondLst>
+                                            <p:cond delay="0"/>
+                                          </p:stCondLst>
+                                        </p:cTn>
+                                        <p:tgtEl>
+                                          <p:spTgt spid="5"/>
+                                        </p:tgtEl>
+                                        <p:attrNameLst>
+                                          <p:attrName>style.visibility</p:attrName>
+                                        </p:attrNameLst>
+                                      </p:cBhvr>
+                                      <p:to>
+                                        <p:strVal val="visible"/>
+                                      </p:to>
+                                    </p:set>
+                                  </p:childTnLst>
+                                </p:cTn>
+                              </p:par>
+                            </p:childTnLst>
+                          </p:cTn>
+                        </p:par>
+                      </p:childTnLst>
+                    </p:cTn>
+                  </p:par>
+                </p:childTnLst>
+              </p:cTn>
+              <p:prevCondLst>
+                <p:cond evt="onPrev" delay="0">
+                  <p:tgtEl>
+                    <p:sldTgt/>
+                  </p:tgtEl>
+                </p:cond>
+              </p:prevCondLst>
+              <p:nextCondLst>
+                <p:cond evt="onNext" delay="0">
+                  <p:tgtEl>
+                    <p:sldTgt/>
+                  </p:tgtEl>
+                </p:cond>
+              </p:nextCondLst>
+            </p:seq>
+          </p:childTnLst>
+        </p:cTn>
+      </p:par>
+    </p:tnLst>
+  </p:timing>
 </p:sld>
 </file>
 
@@ -6835,6 +7122,1436 @@
     <p:extLst>
       <p:ext uri="{BB962C8B-B14F-4D97-AF65-F5344CB8AC3E}">
         <p14:creationId xmlns:p14="http://schemas.microsoft.com/office/powerpoint/2010/main" val="810339624"/>
+      </p:ext>
+    </p:extLst>
+  </p:cSld>
+  <p:clrMapOvr>
+    <a:masterClrMapping/>
+  </p:clrMapOvr>
+</p:sld>
+</file>
+
+<file path=ppt/slides/slide21.xml><?xml version="1.0" encoding="utf-8"?>
+<p:sld xmlns:a="http://schemas.openxmlformats.org/drawingml/2006/main" xmlns:r="http://schemas.openxmlformats.org/officeDocument/2006/relationships" xmlns:p="http://schemas.openxmlformats.org/presentationml/2006/main">
+  <p:cSld>
+    <p:spTree>
+      <p:nvGrpSpPr>
+        <p:cNvPr id="1" name=""/>
+        <p:cNvGrpSpPr/>
+        <p:nvPr/>
+      </p:nvGrpSpPr>
+      <p:grpSpPr>
+        <a:xfrm>
+          <a:off x="0" y="0"/>
+          <a:ext cx="0" cy="0"/>
+          <a:chOff x="0" y="0"/>
+          <a:chExt cx="0" cy="0"/>
+        </a:xfrm>
+      </p:grpSpPr>
+      <p:sp>
+        <p:nvSpPr>
+          <p:cNvPr id="2" name="Title 1">
+            <a:extLst>
+              <a:ext uri="{FF2B5EF4-FFF2-40B4-BE49-F238E27FC236}">
+                <a16:creationId xmlns:a16="http://schemas.microsoft.com/office/drawing/2014/main" id="{AECE0218-F5B7-4EB4-9A14-D893E3A39646}"/>
+              </a:ext>
+            </a:extLst>
+          </p:cNvPr>
+          <p:cNvSpPr>
+            <a:spLocks noGrp="1"/>
+          </p:cNvSpPr>
+          <p:nvPr>
+            <p:ph type="title"/>
+          </p:nvPr>
+        </p:nvSpPr>
+        <p:spPr/>
+        <p:txBody>
+          <a:bodyPr/>
+          <a:lstStyle/>
+          <a:p>
+            <a:pPr algn="ctr"/>
+            <a:r>
+              <a:rPr lang="de-DE" dirty="0"/>
+              <a:t>Deliver Code</a:t>
+            </a:r>
+          </a:p>
+        </p:txBody>
+      </p:sp>
+      <p:sp>
+        <p:nvSpPr>
+          <p:cNvPr id="3" name="Content Placeholder 2">
+            <a:extLst>
+              <a:ext uri="{FF2B5EF4-FFF2-40B4-BE49-F238E27FC236}">
+                <a16:creationId xmlns:a16="http://schemas.microsoft.com/office/drawing/2014/main" id="{75315EF3-4BE9-459B-A792-F63BE74822EA}"/>
+              </a:ext>
+            </a:extLst>
+          </p:cNvPr>
+          <p:cNvSpPr>
+            <a:spLocks noGrp="1"/>
+          </p:cNvSpPr>
+          <p:nvPr>
+            <p:ph idx="1"/>
+          </p:nvPr>
+        </p:nvSpPr>
+        <p:spPr>
+          <a:xfrm>
+            <a:off x="838200" y="1825625"/>
+            <a:ext cx="10515600" cy="4351338"/>
+          </a:xfrm>
+        </p:spPr>
+        <p:txBody>
+          <a:bodyPr/>
+          <a:lstStyle/>
+          <a:p>
+            <a:r>
+              <a:rPr lang="de-DE" dirty="0"/>
+              <a:t>Add </a:t>
+            </a:r>
+            <a:r>
+              <a:rPr lang="de-DE" dirty="0" err="1"/>
+              <a:t>observers</a:t>
+            </a:r>
+            <a:endParaRPr lang="de-DE" dirty="0"/>
+          </a:p>
+        </p:txBody>
+      </p:sp>
+      <p:sp>
+        <p:nvSpPr>
+          <p:cNvPr id="4" name="Slide Number Placeholder 3">
+            <a:extLst>
+              <a:ext uri="{FF2B5EF4-FFF2-40B4-BE49-F238E27FC236}">
+                <a16:creationId xmlns:a16="http://schemas.microsoft.com/office/drawing/2014/main" id="{800B8367-03B5-4739-BC42-CA910AFA44E3}"/>
+              </a:ext>
+            </a:extLst>
+          </p:cNvPr>
+          <p:cNvSpPr>
+            <a:spLocks noGrp="1"/>
+          </p:cNvSpPr>
+          <p:nvPr>
+            <p:ph type="sldNum" sz="quarter" idx="12"/>
+          </p:nvPr>
+        </p:nvSpPr>
+        <p:spPr/>
+        <p:txBody>
+          <a:bodyPr/>
+          <a:lstStyle/>
+          <a:p>
+            <a:fld id="{5FA8D64E-092D-488F-9555-4FE258A6A447}" type="slidenum">
+              <a:rPr lang="de-DE" smtClean="0"/>
+              <a:pPr/>
+              <a:t>21</a:t>
+            </a:fld>
+            <a:endParaRPr lang="de-DE" dirty="0"/>
+          </a:p>
+        </p:txBody>
+      </p:sp>
+      <p:pic>
+        <p:nvPicPr>
+          <p:cNvPr id="9" name="Picture 8">
+            <a:extLst>
+              <a:ext uri="{FF2B5EF4-FFF2-40B4-BE49-F238E27FC236}">
+                <a16:creationId xmlns:a16="http://schemas.microsoft.com/office/drawing/2014/main" id="{5284A1EE-29AD-4CB4-802E-0BC9EFCFD4A5}"/>
+              </a:ext>
+            </a:extLst>
+          </p:cNvPr>
+          <p:cNvPicPr>
+            <a:picLocks noChangeAspect="1"/>
+          </p:cNvPicPr>
+          <p:nvPr/>
+        </p:nvPicPr>
+        <p:blipFill>
+          <a:blip r:embed="rId2">
+            <a:extLst>
+              <a:ext uri="{28A0092B-C50C-407E-A947-70E740481C1C}">
+                <a14:useLocalDpi xmlns:a14="http://schemas.microsoft.com/office/drawing/2010/main" val="0"/>
+              </a:ext>
+            </a:extLst>
+          </a:blip>
+          <a:stretch>
+            <a:fillRect/>
+          </a:stretch>
+        </p:blipFill>
+        <p:spPr>
+          <a:xfrm>
+            <a:off x="838200" y="2331981"/>
+            <a:ext cx="8133318" cy="316626"/>
+          </a:xfrm>
+          <a:prstGeom prst="rect">
+            <a:avLst/>
+          </a:prstGeom>
+        </p:spPr>
+      </p:pic>
+      <p:pic>
+        <p:nvPicPr>
+          <p:cNvPr id="11" name="Picture 10" descr="A screenshot of a cell phone&#10;&#10;Description automatically generated">
+            <a:extLst>
+              <a:ext uri="{FF2B5EF4-FFF2-40B4-BE49-F238E27FC236}">
+                <a16:creationId xmlns:a16="http://schemas.microsoft.com/office/drawing/2014/main" id="{87D09607-515D-49B4-AD48-D01159E0A897}"/>
+              </a:ext>
+            </a:extLst>
+          </p:cNvPr>
+          <p:cNvPicPr>
+            <a:picLocks noChangeAspect="1"/>
+          </p:cNvPicPr>
+          <p:nvPr/>
+        </p:nvPicPr>
+        <p:blipFill>
+          <a:blip r:embed="rId3">
+            <a:extLst>
+              <a:ext uri="{28A0092B-C50C-407E-A947-70E740481C1C}">
+                <a14:useLocalDpi xmlns:a14="http://schemas.microsoft.com/office/drawing/2010/main" val="0"/>
+              </a:ext>
+            </a:extLst>
+          </a:blip>
+          <a:stretch>
+            <a:fillRect/>
+          </a:stretch>
+        </p:blipFill>
+        <p:spPr>
+          <a:xfrm>
+            <a:off x="838200" y="3070167"/>
+            <a:ext cx="7729778" cy="1224649"/>
+          </a:xfrm>
+          <a:prstGeom prst="rect">
+            <a:avLst/>
+          </a:prstGeom>
+        </p:spPr>
+      </p:pic>
+      <p:pic>
+        <p:nvPicPr>
+          <p:cNvPr id="13" name="Picture 12">
+            <a:extLst>
+              <a:ext uri="{FF2B5EF4-FFF2-40B4-BE49-F238E27FC236}">
+                <a16:creationId xmlns:a16="http://schemas.microsoft.com/office/drawing/2014/main" id="{604970D2-B791-4FA8-89E2-46D023CAC1F5}"/>
+              </a:ext>
+            </a:extLst>
+          </p:cNvPr>
+          <p:cNvPicPr>
+            <a:picLocks noChangeAspect="1"/>
+          </p:cNvPicPr>
+          <p:nvPr/>
+        </p:nvPicPr>
+        <p:blipFill>
+          <a:blip r:embed="rId4">
+            <a:extLst>
+              <a:ext uri="{28A0092B-C50C-407E-A947-70E740481C1C}">
+                <a14:useLocalDpi xmlns:a14="http://schemas.microsoft.com/office/drawing/2010/main" val="0"/>
+              </a:ext>
+            </a:extLst>
+          </a:blip>
+          <a:stretch>
+            <a:fillRect/>
+          </a:stretch>
+        </p:blipFill>
+        <p:spPr>
+          <a:xfrm>
+            <a:off x="838200" y="4500479"/>
+            <a:ext cx="6175627" cy="597039"/>
+          </a:xfrm>
+          <a:prstGeom prst="rect">
+            <a:avLst/>
+          </a:prstGeom>
+        </p:spPr>
+      </p:pic>
+    </p:spTree>
+    <p:extLst>
+      <p:ext uri="{BB962C8B-B14F-4D97-AF65-F5344CB8AC3E}">
+        <p14:creationId xmlns:p14="http://schemas.microsoft.com/office/powerpoint/2010/main" val="1980043211"/>
+      </p:ext>
+    </p:extLst>
+  </p:cSld>
+  <p:clrMapOvr>
+    <a:masterClrMapping/>
+  </p:clrMapOvr>
+</p:sld>
+</file>
+
+<file path=ppt/slides/slide22.xml><?xml version="1.0" encoding="utf-8"?>
+<p:sld xmlns:a="http://schemas.openxmlformats.org/drawingml/2006/main" xmlns:r="http://schemas.openxmlformats.org/officeDocument/2006/relationships" xmlns:p="http://schemas.openxmlformats.org/presentationml/2006/main">
+  <p:cSld>
+    <p:spTree>
+      <p:nvGrpSpPr>
+        <p:cNvPr id="1" name=""/>
+        <p:cNvGrpSpPr/>
+        <p:nvPr/>
+      </p:nvGrpSpPr>
+      <p:grpSpPr>
+        <a:xfrm>
+          <a:off x="0" y="0"/>
+          <a:ext cx="0" cy="0"/>
+          <a:chOff x="0" y="0"/>
+          <a:chExt cx="0" cy="0"/>
+        </a:xfrm>
+      </p:grpSpPr>
+      <p:sp>
+        <p:nvSpPr>
+          <p:cNvPr id="2" name="Title 1">
+            <a:extLst>
+              <a:ext uri="{FF2B5EF4-FFF2-40B4-BE49-F238E27FC236}">
+                <a16:creationId xmlns:a16="http://schemas.microsoft.com/office/drawing/2014/main" id="{4934CB8A-2BA8-4199-96F6-5532D2F59B8D}"/>
+              </a:ext>
+            </a:extLst>
+          </p:cNvPr>
+          <p:cNvSpPr>
+            <a:spLocks noGrp="1"/>
+          </p:cNvSpPr>
+          <p:nvPr>
+            <p:ph type="title"/>
+          </p:nvPr>
+        </p:nvSpPr>
+        <p:spPr/>
+        <p:txBody>
+          <a:bodyPr/>
+          <a:lstStyle/>
+          <a:p>
+            <a:pPr algn="ctr"/>
+            <a:r>
+              <a:rPr lang="de-DE" dirty="0"/>
+              <a:t>Deliver Code</a:t>
+            </a:r>
+          </a:p>
+        </p:txBody>
+      </p:sp>
+      <p:sp>
+        <p:nvSpPr>
+          <p:cNvPr id="3" name="Content Placeholder 2">
+            <a:extLst>
+              <a:ext uri="{FF2B5EF4-FFF2-40B4-BE49-F238E27FC236}">
+                <a16:creationId xmlns:a16="http://schemas.microsoft.com/office/drawing/2014/main" id="{643A0F86-71B5-4B59-8906-30755DAB23E7}"/>
+              </a:ext>
+            </a:extLst>
+          </p:cNvPr>
+          <p:cNvSpPr>
+            <a:spLocks noGrp="1"/>
+          </p:cNvSpPr>
+          <p:nvPr>
+            <p:ph idx="1"/>
+          </p:nvPr>
+        </p:nvSpPr>
+        <p:spPr/>
+        <p:txBody>
+          <a:bodyPr/>
+          <a:lstStyle/>
+          <a:p>
+            <a:r>
+              <a:rPr lang="de-DE" dirty="0" err="1"/>
+              <a:t>Timer</a:t>
+            </a:r>
+            <a:endParaRPr lang="de-DE" dirty="0"/>
+          </a:p>
+        </p:txBody>
+      </p:sp>
+      <p:sp>
+        <p:nvSpPr>
+          <p:cNvPr id="4" name="Slide Number Placeholder 3">
+            <a:extLst>
+              <a:ext uri="{FF2B5EF4-FFF2-40B4-BE49-F238E27FC236}">
+                <a16:creationId xmlns:a16="http://schemas.microsoft.com/office/drawing/2014/main" id="{00C85858-4913-4F11-9D15-FBD134258DE6}"/>
+              </a:ext>
+            </a:extLst>
+          </p:cNvPr>
+          <p:cNvSpPr>
+            <a:spLocks noGrp="1"/>
+          </p:cNvSpPr>
+          <p:nvPr>
+            <p:ph type="sldNum" sz="quarter" idx="12"/>
+          </p:nvPr>
+        </p:nvSpPr>
+        <p:spPr/>
+        <p:txBody>
+          <a:bodyPr/>
+          <a:lstStyle/>
+          <a:p>
+            <a:fld id="{5FA8D64E-092D-488F-9555-4FE258A6A447}" type="slidenum">
+              <a:rPr lang="de-DE" smtClean="0"/>
+              <a:pPr/>
+              <a:t>22</a:t>
+            </a:fld>
+            <a:endParaRPr lang="de-DE" dirty="0"/>
+          </a:p>
+        </p:txBody>
+      </p:sp>
+      <p:pic>
+        <p:nvPicPr>
+          <p:cNvPr id="6" name="Picture 5" descr="A screenshot of a social media post&#10;&#10;Description automatically generated">
+            <a:extLst>
+              <a:ext uri="{FF2B5EF4-FFF2-40B4-BE49-F238E27FC236}">
+                <a16:creationId xmlns:a16="http://schemas.microsoft.com/office/drawing/2014/main" id="{8BA5938D-C46D-4B8C-BD75-4846E199282F}"/>
+              </a:ext>
+            </a:extLst>
+          </p:cNvPr>
+          <p:cNvPicPr>
+            <a:picLocks noChangeAspect="1"/>
+          </p:cNvPicPr>
+          <p:nvPr/>
+        </p:nvPicPr>
+        <p:blipFill>
+          <a:blip r:embed="rId2">
+            <a:extLst>
+              <a:ext uri="{28A0092B-C50C-407E-A947-70E740481C1C}">
+                <a14:useLocalDpi xmlns:a14="http://schemas.microsoft.com/office/drawing/2010/main" val="0"/>
+              </a:ext>
+            </a:extLst>
+          </a:blip>
+          <a:stretch>
+            <a:fillRect/>
+          </a:stretch>
+        </p:blipFill>
+        <p:spPr>
+          <a:xfrm>
+            <a:off x="1129589" y="2386908"/>
+            <a:ext cx="8773758" cy="2237643"/>
+          </a:xfrm>
+          <a:prstGeom prst="rect">
+            <a:avLst/>
+          </a:prstGeom>
+        </p:spPr>
+      </p:pic>
+      <p:pic>
+        <p:nvPicPr>
+          <p:cNvPr id="8" name="Picture 7">
+            <a:extLst>
+              <a:ext uri="{FF2B5EF4-FFF2-40B4-BE49-F238E27FC236}">
+                <a16:creationId xmlns:a16="http://schemas.microsoft.com/office/drawing/2014/main" id="{4F56D2E3-E307-4D06-B725-AA9E7D2773AE}"/>
+              </a:ext>
+            </a:extLst>
+          </p:cNvPr>
+          <p:cNvPicPr>
+            <a:picLocks noChangeAspect="1"/>
+          </p:cNvPicPr>
+          <p:nvPr/>
+        </p:nvPicPr>
+        <p:blipFill>
+          <a:blip r:embed="rId3">
+            <a:extLst>
+              <a:ext uri="{28A0092B-C50C-407E-A947-70E740481C1C}">
+                <a14:useLocalDpi xmlns:a14="http://schemas.microsoft.com/office/drawing/2010/main" val="0"/>
+              </a:ext>
+            </a:extLst>
+          </a:blip>
+          <a:stretch>
+            <a:fillRect/>
+          </a:stretch>
+        </p:blipFill>
+        <p:spPr>
+          <a:xfrm>
+            <a:off x="982444" y="4624551"/>
+            <a:ext cx="6353777" cy="387342"/>
+          </a:xfrm>
+          <a:prstGeom prst="rect">
+            <a:avLst/>
+          </a:prstGeom>
+        </p:spPr>
+      </p:pic>
+    </p:spTree>
+    <p:extLst>
+      <p:ext uri="{BB962C8B-B14F-4D97-AF65-F5344CB8AC3E}">
+        <p14:creationId xmlns:p14="http://schemas.microsoft.com/office/powerpoint/2010/main" val="4255772592"/>
+      </p:ext>
+    </p:extLst>
+  </p:cSld>
+  <p:clrMapOvr>
+    <a:masterClrMapping/>
+  </p:clrMapOvr>
+</p:sld>
+</file>
+
+<file path=ppt/slides/slide23.xml><?xml version="1.0" encoding="utf-8"?>
+<p:sld xmlns:a="http://schemas.openxmlformats.org/drawingml/2006/main" xmlns:r="http://schemas.openxmlformats.org/officeDocument/2006/relationships" xmlns:p="http://schemas.openxmlformats.org/presentationml/2006/main">
+  <p:cSld>
+    <p:spTree>
+      <p:nvGrpSpPr>
+        <p:cNvPr id="1" name=""/>
+        <p:cNvGrpSpPr/>
+        <p:nvPr/>
+      </p:nvGrpSpPr>
+      <p:grpSpPr>
+        <a:xfrm>
+          <a:off x="0" y="0"/>
+          <a:ext cx="0" cy="0"/>
+          <a:chOff x="0" y="0"/>
+          <a:chExt cx="0" cy="0"/>
+        </a:xfrm>
+      </p:grpSpPr>
+      <p:sp>
+        <p:nvSpPr>
+          <p:cNvPr id="2" name="Title 1">
+            <a:extLst>
+              <a:ext uri="{FF2B5EF4-FFF2-40B4-BE49-F238E27FC236}">
+                <a16:creationId xmlns:a16="http://schemas.microsoft.com/office/drawing/2014/main" id="{D6D57354-410B-4488-95B8-37FE30D9D703}"/>
+              </a:ext>
+            </a:extLst>
+          </p:cNvPr>
+          <p:cNvSpPr>
+            <a:spLocks noGrp="1"/>
+          </p:cNvSpPr>
+          <p:nvPr>
+            <p:ph type="title"/>
+          </p:nvPr>
+        </p:nvSpPr>
+        <p:spPr/>
+        <p:txBody>
+          <a:bodyPr/>
+          <a:lstStyle/>
+          <a:p>
+            <a:pPr algn="ctr"/>
+            <a:r>
+              <a:rPr lang="de-DE" dirty="0"/>
+              <a:t>Deliver Code</a:t>
+            </a:r>
+          </a:p>
+        </p:txBody>
+      </p:sp>
+      <p:sp>
+        <p:nvSpPr>
+          <p:cNvPr id="4" name="Slide Number Placeholder 3">
+            <a:extLst>
+              <a:ext uri="{FF2B5EF4-FFF2-40B4-BE49-F238E27FC236}">
+                <a16:creationId xmlns:a16="http://schemas.microsoft.com/office/drawing/2014/main" id="{578C554B-296A-4A0C-BB8E-9EE03FA08712}"/>
+              </a:ext>
+            </a:extLst>
+          </p:cNvPr>
+          <p:cNvSpPr>
+            <a:spLocks noGrp="1"/>
+          </p:cNvSpPr>
+          <p:nvPr>
+            <p:ph type="sldNum" sz="quarter" idx="12"/>
+          </p:nvPr>
+        </p:nvSpPr>
+        <p:spPr/>
+        <p:txBody>
+          <a:bodyPr/>
+          <a:lstStyle/>
+          <a:p>
+            <a:fld id="{5FA8D64E-092D-488F-9555-4FE258A6A447}" type="slidenum">
+              <a:rPr lang="de-DE" smtClean="0"/>
+              <a:pPr/>
+              <a:t>23</a:t>
+            </a:fld>
+            <a:endParaRPr lang="de-DE" dirty="0"/>
+          </a:p>
+        </p:txBody>
+      </p:sp>
+      <p:pic>
+        <p:nvPicPr>
+          <p:cNvPr id="6" name="Picture 5" descr="A screenshot of a social media post&#10;&#10;Description automatically generated">
+            <a:extLst>
+              <a:ext uri="{FF2B5EF4-FFF2-40B4-BE49-F238E27FC236}">
+                <a16:creationId xmlns:a16="http://schemas.microsoft.com/office/drawing/2014/main" id="{75182C64-1506-4CF0-9248-EA8F69EE38E1}"/>
+              </a:ext>
+            </a:extLst>
+          </p:cNvPr>
+          <p:cNvPicPr>
+            <a:picLocks noChangeAspect="1"/>
+          </p:cNvPicPr>
+          <p:nvPr/>
+        </p:nvPicPr>
+        <p:blipFill>
+          <a:blip r:embed="rId2">
+            <a:extLst>
+              <a:ext uri="{28A0092B-C50C-407E-A947-70E740481C1C}">
+                <a14:useLocalDpi xmlns:a14="http://schemas.microsoft.com/office/drawing/2010/main" val="0"/>
+              </a:ext>
+            </a:extLst>
+          </a:blip>
+          <a:stretch>
+            <a:fillRect/>
+          </a:stretch>
+        </p:blipFill>
+        <p:spPr>
+          <a:xfrm>
+            <a:off x="838200" y="1345145"/>
+            <a:ext cx="6914538" cy="4167531"/>
+          </a:xfrm>
+          <a:prstGeom prst="rect">
+            <a:avLst/>
+          </a:prstGeom>
+        </p:spPr>
+      </p:pic>
+      <p:pic>
+        <p:nvPicPr>
+          <p:cNvPr id="8" name="Picture 7" descr="A screenshot of a cell phone&#10;&#10;Description automatically generated">
+            <a:extLst>
+              <a:ext uri="{FF2B5EF4-FFF2-40B4-BE49-F238E27FC236}">
+                <a16:creationId xmlns:a16="http://schemas.microsoft.com/office/drawing/2014/main" id="{C55853B2-3339-4708-A1D9-03F55E77CD27}"/>
+              </a:ext>
+            </a:extLst>
+          </p:cNvPr>
+          <p:cNvPicPr>
+            <a:picLocks noChangeAspect="1"/>
+          </p:cNvPicPr>
+          <p:nvPr/>
+        </p:nvPicPr>
+        <p:blipFill>
+          <a:blip r:embed="rId3">
+            <a:extLst>
+              <a:ext uri="{28A0092B-C50C-407E-A947-70E740481C1C}">
+                <a14:useLocalDpi xmlns:a14="http://schemas.microsoft.com/office/drawing/2010/main" val="0"/>
+              </a:ext>
+            </a:extLst>
+          </a:blip>
+          <a:stretch>
+            <a:fillRect/>
+          </a:stretch>
+        </p:blipFill>
+        <p:spPr>
+          <a:xfrm>
+            <a:off x="838200" y="5471532"/>
+            <a:ext cx="2756170" cy="1325563"/>
+          </a:xfrm>
+          <a:prstGeom prst="rect">
+            <a:avLst/>
+          </a:prstGeom>
+        </p:spPr>
+      </p:pic>
+    </p:spTree>
+    <p:extLst>
+      <p:ext uri="{BB962C8B-B14F-4D97-AF65-F5344CB8AC3E}">
+        <p14:creationId xmlns:p14="http://schemas.microsoft.com/office/powerpoint/2010/main" val="2324983478"/>
+      </p:ext>
+    </p:extLst>
+  </p:cSld>
+  <p:clrMapOvr>
+    <a:masterClrMapping/>
+  </p:clrMapOvr>
+</p:sld>
+</file>
+
+<file path=ppt/slides/slide24.xml><?xml version="1.0" encoding="utf-8"?>
+<p:sld xmlns:a="http://schemas.openxmlformats.org/drawingml/2006/main" xmlns:r="http://schemas.openxmlformats.org/officeDocument/2006/relationships" xmlns:p="http://schemas.openxmlformats.org/presentationml/2006/main">
+  <p:cSld>
+    <p:spTree>
+      <p:nvGrpSpPr>
+        <p:cNvPr id="1" name=""/>
+        <p:cNvGrpSpPr/>
+        <p:nvPr/>
+      </p:nvGrpSpPr>
+      <p:grpSpPr>
+        <a:xfrm>
+          <a:off x="0" y="0"/>
+          <a:ext cx="0" cy="0"/>
+          <a:chOff x="0" y="0"/>
+          <a:chExt cx="0" cy="0"/>
+        </a:xfrm>
+      </p:grpSpPr>
+      <p:sp>
+        <p:nvSpPr>
+          <p:cNvPr id="2" name="Title 1">
+            <a:extLst>
+              <a:ext uri="{FF2B5EF4-FFF2-40B4-BE49-F238E27FC236}">
+                <a16:creationId xmlns:a16="http://schemas.microsoft.com/office/drawing/2014/main" id="{4A6B3EA1-A68A-4050-B293-9FC3AF0BFC55}"/>
+              </a:ext>
+            </a:extLst>
+          </p:cNvPr>
+          <p:cNvSpPr>
+            <a:spLocks noGrp="1"/>
+          </p:cNvSpPr>
+          <p:nvPr>
+            <p:ph type="title"/>
+          </p:nvPr>
+        </p:nvSpPr>
+        <p:spPr/>
+        <p:txBody>
+          <a:bodyPr/>
+          <a:lstStyle/>
+          <a:p>
+            <a:pPr algn="ctr"/>
+            <a:r>
+              <a:rPr lang="de-DE" dirty="0"/>
+              <a:t>Light Sensor Code</a:t>
+            </a:r>
+          </a:p>
+        </p:txBody>
+      </p:sp>
+      <p:pic>
+        <p:nvPicPr>
+          <p:cNvPr id="6" name="Content Placeholder 5">
+            <a:extLst>
+              <a:ext uri="{FF2B5EF4-FFF2-40B4-BE49-F238E27FC236}">
+                <a16:creationId xmlns:a16="http://schemas.microsoft.com/office/drawing/2014/main" id="{338F2FB1-AB49-4029-B7FA-D531E27803BA}"/>
+              </a:ext>
+            </a:extLst>
+          </p:cNvPr>
+          <p:cNvPicPr>
+            <a:picLocks noGrp="1" noChangeAspect="1"/>
+          </p:cNvPicPr>
+          <p:nvPr>
+            <p:ph idx="1"/>
+          </p:nvPr>
+        </p:nvPicPr>
+        <p:blipFill>
+          <a:blip r:embed="rId2">
+            <a:extLst>
+              <a:ext uri="{28A0092B-C50C-407E-A947-70E740481C1C}">
+                <a14:useLocalDpi xmlns:a14="http://schemas.microsoft.com/office/drawing/2010/main" val="0"/>
+              </a:ext>
+            </a:extLst>
+          </a:blip>
+          <a:stretch>
+            <a:fillRect/>
+          </a:stretch>
+        </p:blipFill>
+        <p:spPr>
+          <a:xfrm>
+            <a:off x="789677" y="1690687"/>
+            <a:ext cx="7814140" cy="879091"/>
+          </a:xfrm>
+        </p:spPr>
+      </p:pic>
+      <p:sp>
+        <p:nvSpPr>
+          <p:cNvPr id="4" name="Slide Number Placeholder 3">
+            <a:extLst>
+              <a:ext uri="{FF2B5EF4-FFF2-40B4-BE49-F238E27FC236}">
+                <a16:creationId xmlns:a16="http://schemas.microsoft.com/office/drawing/2014/main" id="{CFB7A28A-D6A4-4116-9DE6-ABDEB718054D}"/>
+              </a:ext>
+            </a:extLst>
+          </p:cNvPr>
+          <p:cNvSpPr>
+            <a:spLocks noGrp="1"/>
+          </p:cNvSpPr>
+          <p:nvPr>
+            <p:ph type="sldNum" sz="quarter" idx="12"/>
+          </p:nvPr>
+        </p:nvSpPr>
+        <p:spPr/>
+        <p:txBody>
+          <a:bodyPr/>
+          <a:lstStyle/>
+          <a:p>
+            <a:fld id="{5FA8D64E-092D-488F-9555-4FE258A6A447}" type="slidenum">
+              <a:rPr lang="de-DE" smtClean="0"/>
+              <a:pPr/>
+              <a:t>24</a:t>
+            </a:fld>
+            <a:endParaRPr lang="de-DE" dirty="0"/>
+          </a:p>
+        </p:txBody>
+      </p:sp>
+      <p:pic>
+        <p:nvPicPr>
+          <p:cNvPr id="10" name="Picture 9" descr="A screenshot of a cell phone&#10;&#10;Description automatically generated">
+            <a:extLst>
+              <a:ext uri="{FF2B5EF4-FFF2-40B4-BE49-F238E27FC236}">
+                <a16:creationId xmlns:a16="http://schemas.microsoft.com/office/drawing/2014/main" id="{D7346FC3-B594-43A8-BDBB-6FD89D509014}"/>
+              </a:ext>
+            </a:extLst>
+          </p:cNvPr>
+          <p:cNvPicPr>
+            <a:picLocks noChangeAspect="1"/>
+          </p:cNvPicPr>
+          <p:nvPr/>
+        </p:nvPicPr>
+        <p:blipFill>
+          <a:blip r:embed="rId3">
+            <a:extLst>
+              <a:ext uri="{28A0092B-C50C-407E-A947-70E740481C1C}">
+                <a14:useLocalDpi xmlns:a14="http://schemas.microsoft.com/office/drawing/2010/main" val="0"/>
+              </a:ext>
+            </a:extLst>
+          </a:blip>
+          <a:stretch>
+            <a:fillRect/>
+          </a:stretch>
+        </p:blipFill>
+        <p:spPr>
+          <a:xfrm>
+            <a:off x="789677" y="3202739"/>
+            <a:ext cx="5370855" cy="2170968"/>
+          </a:xfrm>
+          <a:prstGeom prst="rect">
+            <a:avLst/>
+          </a:prstGeom>
+        </p:spPr>
+      </p:pic>
+      <p:pic>
+        <p:nvPicPr>
+          <p:cNvPr id="12" name="Picture 11" descr="A screenshot of a cell phone&#10;&#10;Description automatically generated">
+            <a:extLst>
+              <a:ext uri="{FF2B5EF4-FFF2-40B4-BE49-F238E27FC236}">
+                <a16:creationId xmlns:a16="http://schemas.microsoft.com/office/drawing/2014/main" id="{8B9A7239-02A5-495B-9F85-15B905672602}"/>
+              </a:ext>
+            </a:extLst>
+          </p:cNvPr>
+          <p:cNvPicPr>
+            <a:picLocks noChangeAspect="1"/>
+          </p:cNvPicPr>
+          <p:nvPr/>
+        </p:nvPicPr>
+        <p:blipFill>
+          <a:blip r:embed="rId4">
+            <a:extLst>
+              <a:ext uri="{28A0092B-C50C-407E-A947-70E740481C1C}">
+                <a14:useLocalDpi xmlns:a14="http://schemas.microsoft.com/office/drawing/2010/main" val="0"/>
+              </a:ext>
+            </a:extLst>
+          </a:blip>
+          <a:stretch>
+            <a:fillRect/>
+          </a:stretch>
+        </p:blipFill>
+        <p:spPr>
+          <a:xfrm>
+            <a:off x="7142480" y="3139752"/>
+            <a:ext cx="2936240" cy="2296942"/>
+          </a:xfrm>
+          <a:prstGeom prst="rect">
+            <a:avLst/>
+          </a:prstGeom>
+        </p:spPr>
+      </p:pic>
+    </p:spTree>
+    <p:extLst>
+      <p:ext uri="{BB962C8B-B14F-4D97-AF65-F5344CB8AC3E}">
+        <p14:creationId xmlns:p14="http://schemas.microsoft.com/office/powerpoint/2010/main" val="3660575690"/>
+      </p:ext>
+    </p:extLst>
+  </p:cSld>
+  <p:clrMapOvr>
+    <a:masterClrMapping/>
+  </p:clrMapOvr>
+</p:sld>
+</file>
+
+<file path=ppt/slides/slide25.xml><?xml version="1.0" encoding="utf-8"?>
+<p:sld xmlns:a="http://schemas.openxmlformats.org/drawingml/2006/main" xmlns:r="http://schemas.openxmlformats.org/officeDocument/2006/relationships" xmlns:p="http://schemas.openxmlformats.org/presentationml/2006/main">
+  <p:cSld>
+    <p:spTree>
+      <p:nvGrpSpPr>
+        <p:cNvPr id="1" name=""/>
+        <p:cNvGrpSpPr/>
+        <p:nvPr/>
+      </p:nvGrpSpPr>
+      <p:grpSpPr>
+        <a:xfrm>
+          <a:off x="0" y="0"/>
+          <a:ext cx="0" cy="0"/>
+          <a:chOff x="0" y="0"/>
+          <a:chExt cx="0" cy="0"/>
+        </a:xfrm>
+      </p:grpSpPr>
+      <p:sp>
+        <p:nvSpPr>
+          <p:cNvPr id="2" name="Title 1">
+            <a:extLst>
+              <a:ext uri="{FF2B5EF4-FFF2-40B4-BE49-F238E27FC236}">
+                <a16:creationId xmlns:a16="http://schemas.microsoft.com/office/drawing/2014/main" id="{CEDB5BBD-7A7C-47CD-B025-6FD1786C7CB6}"/>
+              </a:ext>
+            </a:extLst>
+          </p:cNvPr>
+          <p:cNvSpPr>
+            <a:spLocks noGrp="1"/>
+          </p:cNvSpPr>
+          <p:nvPr>
+            <p:ph type="title"/>
+          </p:nvPr>
+        </p:nvSpPr>
+        <p:spPr/>
+        <p:txBody>
+          <a:bodyPr/>
+          <a:lstStyle/>
+          <a:p>
+            <a:pPr algn="ctr"/>
+            <a:r>
+              <a:rPr lang="de-DE" dirty="0"/>
+              <a:t>Light Sensor Code</a:t>
+            </a:r>
+          </a:p>
+        </p:txBody>
+      </p:sp>
+      <p:sp>
+        <p:nvSpPr>
+          <p:cNvPr id="4" name="Slide Number Placeholder 3">
+            <a:extLst>
+              <a:ext uri="{FF2B5EF4-FFF2-40B4-BE49-F238E27FC236}">
+                <a16:creationId xmlns:a16="http://schemas.microsoft.com/office/drawing/2014/main" id="{9C1E4D8F-0FF1-4C86-BFB5-6AC876BA6CDA}"/>
+              </a:ext>
+            </a:extLst>
+          </p:cNvPr>
+          <p:cNvSpPr>
+            <a:spLocks noGrp="1"/>
+          </p:cNvSpPr>
+          <p:nvPr>
+            <p:ph type="sldNum" sz="quarter" idx="12"/>
+          </p:nvPr>
+        </p:nvSpPr>
+        <p:spPr/>
+        <p:txBody>
+          <a:bodyPr/>
+          <a:lstStyle/>
+          <a:p>
+            <a:fld id="{5FA8D64E-092D-488F-9555-4FE258A6A447}" type="slidenum">
+              <a:rPr lang="de-DE" smtClean="0"/>
+              <a:pPr/>
+              <a:t>25</a:t>
+            </a:fld>
+            <a:endParaRPr lang="de-DE" dirty="0"/>
+          </a:p>
+        </p:txBody>
+      </p:sp>
+      <p:pic>
+        <p:nvPicPr>
+          <p:cNvPr id="5" name="Picture 4" descr="A screenshot of a social media post&#10;&#10;Description automatically generated">
+            <a:extLst>
+              <a:ext uri="{FF2B5EF4-FFF2-40B4-BE49-F238E27FC236}">
+                <a16:creationId xmlns:a16="http://schemas.microsoft.com/office/drawing/2014/main" id="{0F8A0E78-027E-4A60-B7F2-A2CF9235D91E}"/>
+              </a:ext>
+            </a:extLst>
+          </p:cNvPr>
+          <p:cNvPicPr>
+            <a:picLocks noChangeAspect="1"/>
+          </p:cNvPicPr>
+          <p:nvPr/>
+        </p:nvPicPr>
+        <p:blipFill>
+          <a:blip r:embed="rId2">
+            <a:extLst>
+              <a:ext uri="{28A0092B-C50C-407E-A947-70E740481C1C}">
+                <a14:useLocalDpi xmlns:a14="http://schemas.microsoft.com/office/drawing/2010/main" val="0"/>
+              </a:ext>
+            </a:extLst>
+          </a:blip>
+          <a:stretch>
+            <a:fillRect/>
+          </a:stretch>
+        </p:blipFill>
+        <p:spPr>
+          <a:xfrm>
+            <a:off x="1062947" y="1528748"/>
+            <a:ext cx="7336416" cy="4672355"/>
+          </a:xfrm>
+          <a:prstGeom prst="rect">
+            <a:avLst/>
+          </a:prstGeom>
+        </p:spPr>
+      </p:pic>
+    </p:spTree>
+    <p:extLst>
+      <p:ext uri="{BB962C8B-B14F-4D97-AF65-F5344CB8AC3E}">
+        <p14:creationId xmlns:p14="http://schemas.microsoft.com/office/powerpoint/2010/main" val="3610693449"/>
+      </p:ext>
+    </p:extLst>
+  </p:cSld>
+  <p:clrMapOvr>
+    <a:masterClrMapping/>
+  </p:clrMapOvr>
+</p:sld>
+</file>
+
+<file path=ppt/slides/slide26.xml><?xml version="1.0" encoding="utf-8"?>
+<p:sld xmlns:a="http://schemas.openxmlformats.org/drawingml/2006/main" xmlns:r="http://schemas.openxmlformats.org/officeDocument/2006/relationships" xmlns:p="http://schemas.openxmlformats.org/presentationml/2006/main">
+  <p:cSld>
+    <p:spTree>
+      <p:nvGrpSpPr>
+        <p:cNvPr id="1" name=""/>
+        <p:cNvGrpSpPr/>
+        <p:nvPr/>
+      </p:nvGrpSpPr>
+      <p:grpSpPr>
+        <a:xfrm>
+          <a:off x="0" y="0"/>
+          <a:ext cx="0" cy="0"/>
+          <a:chOff x="0" y="0"/>
+          <a:chExt cx="0" cy="0"/>
+        </a:xfrm>
+      </p:grpSpPr>
+      <p:sp>
+        <p:nvSpPr>
+          <p:cNvPr id="2" name="Title 1">
+            <a:extLst>
+              <a:ext uri="{FF2B5EF4-FFF2-40B4-BE49-F238E27FC236}">
+                <a16:creationId xmlns:a16="http://schemas.microsoft.com/office/drawing/2014/main" id="{15DDDFFF-85FD-4822-AD5D-DC7AB666B2C7}"/>
+              </a:ext>
+            </a:extLst>
+          </p:cNvPr>
+          <p:cNvSpPr>
+            <a:spLocks noGrp="1"/>
+          </p:cNvSpPr>
+          <p:nvPr>
+            <p:ph type="title"/>
+          </p:nvPr>
+        </p:nvSpPr>
+        <p:spPr/>
+        <p:txBody>
+          <a:bodyPr/>
+          <a:lstStyle/>
+          <a:p>
+            <a:pPr algn="ctr"/>
+            <a:r>
+              <a:rPr lang="de-DE" dirty="0"/>
+              <a:t>Device Motion Code</a:t>
+            </a:r>
+          </a:p>
+        </p:txBody>
+      </p:sp>
+      <p:sp>
+        <p:nvSpPr>
+          <p:cNvPr id="3" name="Content Placeholder 2">
+            <a:extLst>
+              <a:ext uri="{FF2B5EF4-FFF2-40B4-BE49-F238E27FC236}">
+                <a16:creationId xmlns:a16="http://schemas.microsoft.com/office/drawing/2014/main" id="{D78E6407-979D-498C-A271-3AE022B43E49}"/>
+              </a:ext>
+            </a:extLst>
+          </p:cNvPr>
+          <p:cNvSpPr>
+            <a:spLocks noGrp="1"/>
+          </p:cNvSpPr>
+          <p:nvPr>
+            <p:ph idx="1"/>
+          </p:nvPr>
+        </p:nvSpPr>
+        <p:spPr>
+          <a:xfrm>
+            <a:off x="838200" y="1825625"/>
+            <a:ext cx="10515600" cy="654816"/>
+          </a:xfrm>
+        </p:spPr>
+        <p:txBody>
+          <a:bodyPr/>
+          <a:lstStyle/>
+          <a:p>
+            <a:r>
+              <a:rPr lang="de-DE" dirty="0"/>
+              <a:t>Use </a:t>
+            </a:r>
+            <a:r>
+              <a:rPr lang="de-DE" dirty="0" err="1"/>
+              <a:t>CMMotionManager</a:t>
+            </a:r>
+            <a:endParaRPr lang="de-DE" dirty="0"/>
+          </a:p>
+        </p:txBody>
+      </p:sp>
+      <p:sp>
+        <p:nvSpPr>
+          <p:cNvPr id="4" name="Slide Number Placeholder 3">
+            <a:extLst>
+              <a:ext uri="{FF2B5EF4-FFF2-40B4-BE49-F238E27FC236}">
+                <a16:creationId xmlns:a16="http://schemas.microsoft.com/office/drawing/2014/main" id="{4348C809-151F-4271-BA59-1F2C7BC0C5C3}"/>
+              </a:ext>
+            </a:extLst>
+          </p:cNvPr>
+          <p:cNvSpPr>
+            <a:spLocks noGrp="1"/>
+          </p:cNvSpPr>
+          <p:nvPr>
+            <p:ph type="sldNum" sz="quarter" idx="12"/>
+          </p:nvPr>
+        </p:nvSpPr>
+        <p:spPr/>
+        <p:txBody>
+          <a:bodyPr/>
+          <a:lstStyle/>
+          <a:p>
+            <a:fld id="{5FA8D64E-092D-488F-9555-4FE258A6A447}" type="slidenum">
+              <a:rPr lang="de-DE" smtClean="0"/>
+              <a:pPr/>
+              <a:t>26</a:t>
+            </a:fld>
+            <a:endParaRPr lang="de-DE" dirty="0"/>
+          </a:p>
+        </p:txBody>
+      </p:sp>
+      <p:pic>
+        <p:nvPicPr>
+          <p:cNvPr id="5" name="Picture 4" descr="A screenshot of a cell phone&#10;&#10;Description automatically generated">
+            <a:extLst>
+              <a:ext uri="{FF2B5EF4-FFF2-40B4-BE49-F238E27FC236}">
+                <a16:creationId xmlns:a16="http://schemas.microsoft.com/office/drawing/2014/main" id="{D4832DC4-91CB-4BC5-891D-2E715CA6CB72}"/>
+              </a:ext>
+            </a:extLst>
+          </p:cNvPr>
+          <p:cNvPicPr>
+            <a:picLocks noChangeAspect="1"/>
+          </p:cNvPicPr>
+          <p:nvPr/>
+        </p:nvPicPr>
+        <p:blipFill>
+          <a:blip r:embed="rId2">
+            <a:extLst>
+              <a:ext uri="{28A0092B-C50C-407E-A947-70E740481C1C}">
+                <a14:useLocalDpi xmlns:a14="http://schemas.microsoft.com/office/drawing/2010/main" val="0"/>
+              </a:ext>
+            </a:extLst>
+          </a:blip>
+          <a:stretch>
+            <a:fillRect/>
+          </a:stretch>
+        </p:blipFill>
+        <p:spPr>
+          <a:xfrm>
+            <a:off x="1048407" y="2369027"/>
+            <a:ext cx="6092736" cy="2008533"/>
+          </a:xfrm>
+          <a:prstGeom prst="rect">
+            <a:avLst/>
+          </a:prstGeom>
+        </p:spPr>
+      </p:pic>
+      <p:pic>
+        <p:nvPicPr>
+          <p:cNvPr id="6" name="Picture 5">
+            <a:extLst>
+              <a:ext uri="{FF2B5EF4-FFF2-40B4-BE49-F238E27FC236}">
+                <a16:creationId xmlns:a16="http://schemas.microsoft.com/office/drawing/2014/main" id="{CFA81F77-3DA4-4D89-ABFF-C9BE91ADA75C}"/>
+              </a:ext>
+            </a:extLst>
+          </p:cNvPr>
+          <p:cNvPicPr>
+            <a:picLocks noChangeAspect="1"/>
+          </p:cNvPicPr>
+          <p:nvPr/>
+        </p:nvPicPr>
+        <p:blipFill>
+          <a:blip r:embed="rId3">
+            <a:extLst>
+              <a:ext uri="{28A0092B-C50C-407E-A947-70E740481C1C}">
+                <a14:useLocalDpi xmlns:a14="http://schemas.microsoft.com/office/drawing/2010/main" val="0"/>
+              </a:ext>
+            </a:extLst>
+          </a:blip>
+          <a:stretch>
+            <a:fillRect/>
+          </a:stretch>
+        </p:blipFill>
+        <p:spPr>
+          <a:xfrm>
+            <a:off x="1048407" y="4467660"/>
+            <a:ext cx="5676887" cy="346077"/>
+          </a:xfrm>
+          <a:prstGeom prst="rect">
+            <a:avLst/>
+          </a:prstGeom>
+        </p:spPr>
+      </p:pic>
+    </p:spTree>
+    <p:extLst>
+      <p:ext uri="{BB962C8B-B14F-4D97-AF65-F5344CB8AC3E}">
+        <p14:creationId xmlns:p14="http://schemas.microsoft.com/office/powerpoint/2010/main" val="1074982672"/>
+      </p:ext>
+    </p:extLst>
+  </p:cSld>
+  <p:clrMapOvr>
+    <a:masterClrMapping/>
+  </p:clrMapOvr>
+</p:sld>
+</file>
+
+<file path=ppt/slides/slide27.xml><?xml version="1.0" encoding="utf-8"?>
+<p:sld xmlns:a="http://schemas.openxmlformats.org/drawingml/2006/main" xmlns:r="http://schemas.openxmlformats.org/officeDocument/2006/relationships" xmlns:p="http://schemas.openxmlformats.org/presentationml/2006/main">
+  <p:cSld>
+    <p:spTree>
+      <p:nvGrpSpPr>
+        <p:cNvPr id="1" name=""/>
+        <p:cNvGrpSpPr/>
+        <p:nvPr/>
+      </p:nvGrpSpPr>
+      <p:grpSpPr>
+        <a:xfrm>
+          <a:off x="0" y="0"/>
+          <a:ext cx="0" cy="0"/>
+          <a:chOff x="0" y="0"/>
+          <a:chExt cx="0" cy="0"/>
+        </a:xfrm>
+      </p:grpSpPr>
+      <p:sp>
+        <p:nvSpPr>
+          <p:cNvPr id="2" name="Title 1">
+            <a:extLst>
+              <a:ext uri="{FF2B5EF4-FFF2-40B4-BE49-F238E27FC236}">
+                <a16:creationId xmlns:a16="http://schemas.microsoft.com/office/drawing/2014/main" id="{31FAF000-FF9C-42B6-9D87-151188C950F7}"/>
+              </a:ext>
+            </a:extLst>
+          </p:cNvPr>
+          <p:cNvSpPr>
+            <a:spLocks noGrp="1"/>
+          </p:cNvSpPr>
+          <p:nvPr>
+            <p:ph type="title"/>
+          </p:nvPr>
+        </p:nvSpPr>
+        <p:spPr/>
+        <p:txBody>
+          <a:bodyPr/>
+          <a:lstStyle/>
+          <a:p>
+            <a:pPr algn="ctr"/>
+            <a:r>
+              <a:rPr lang="de-DE" dirty="0"/>
+              <a:t>Sound Code</a:t>
+            </a:r>
+          </a:p>
+        </p:txBody>
+      </p:sp>
+      <p:sp>
+        <p:nvSpPr>
+          <p:cNvPr id="4" name="Slide Number Placeholder 3">
+            <a:extLst>
+              <a:ext uri="{FF2B5EF4-FFF2-40B4-BE49-F238E27FC236}">
+                <a16:creationId xmlns:a16="http://schemas.microsoft.com/office/drawing/2014/main" id="{5409047F-5958-43FA-B9A5-C9519071531F}"/>
+              </a:ext>
+            </a:extLst>
+          </p:cNvPr>
+          <p:cNvSpPr>
+            <a:spLocks noGrp="1"/>
+          </p:cNvSpPr>
+          <p:nvPr>
+            <p:ph type="sldNum" sz="quarter" idx="12"/>
+          </p:nvPr>
+        </p:nvSpPr>
+        <p:spPr/>
+        <p:txBody>
+          <a:bodyPr/>
+          <a:lstStyle/>
+          <a:p>
+            <a:fld id="{5FA8D64E-092D-488F-9555-4FE258A6A447}" type="slidenum">
+              <a:rPr lang="de-DE" smtClean="0"/>
+              <a:pPr/>
+              <a:t>27</a:t>
+            </a:fld>
+            <a:endParaRPr lang="de-DE" dirty="0"/>
+          </a:p>
+        </p:txBody>
+      </p:sp>
+      <p:pic>
+        <p:nvPicPr>
+          <p:cNvPr id="6" name="Picture 5" descr="A picture containing knife, table&#10;&#10;Description automatically generated">
+            <a:extLst>
+              <a:ext uri="{FF2B5EF4-FFF2-40B4-BE49-F238E27FC236}">
+                <a16:creationId xmlns:a16="http://schemas.microsoft.com/office/drawing/2014/main" id="{DBA2FE64-3196-4351-B5B8-F95D59B02466}"/>
+              </a:ext>
+            </a:extLst>
+          </p:cNvPr>
+          <p:cNvPicPr>
+            <a:picLocks noChangeAspect="1"/>
+          </p:cNvPicPr>
+          <p:nvPr/>
+        </p:nvPicPr>
+        <p:blipFill>
+          <a:blip r:embed="rId2">
+            <a:extLst>
+              <a:ext uri="{28A0092B-C50C-407E-A947-70E740481C1C}">
+                <a14:useLocalDpi xmlns:a14="http://schemas.microsoft.com/office/drawing/2010/main" val="0"/>
+              </a:ext>
+            </a:extLst>
+          </a:blip>
+          <a:stretch>
+            <a:fillRect/>
+          </a:stretch>
+        </p:blipFill>
+        <p:spPr>
+          <a:xfrm>
+            <a:off x="838200" y="1459705"/>
+            <a:ext cx="3359976" cy="568792"/>
+          </a:xfrm>
+          <a:prstGeom prst="rect">
+            <a:avLst/>
+          </a:prstGeom>
+        </p:spPr>
+      </p:pic>
+      <p:pic>
+        <p:nvPicPr>
+          <p:cNvPr id="8" name="Picture 7" descr="A screenshot of a social media post&#10;&#10;Description automatically generated">
+            <a:extLst>
+              <a:ext uri="{FF2B5EF4-FFF2-40B4-BE49-F238E27FC236}">
+                <a16:creationId xmlns:a16="http://schemas.microsoft.com/office/drawing/2014/main" id="{E19BC267-1576-4FEF-A8B7-FC2764724EE4}"/>
+              </a:ext>
+            </a:extLst>
+          </p:cNvPr>
+          <p:cNvPicPr>
+            <a:picLocks noChangeAspect="1"/>
+          </p:cNvPicPr>
+          <p:nvPr/>
+        </p:nvPicPr>
+        <p:blipFill>
+          <a:blip r:embed="rId3">
+            <a:extLst>
+              <a:ext uri="{28A0092B-C50C-407E-A947-70E740481C1C}">
+                <a14:useLocalDpi xmlns:a14="http://schemas.microsoft.com/office/drawing/2010/main" val="0"/>
+              </a:ext>
+            </a:extLst>
+          </a:blip>
+          <a:stretch>
+            <a:fillRect/>
+          </a:stretch>
+        </p:blipFill>
+        <p:spPr>
+          <a:xfrm>
+            <a:off x="838200" y="2336471"/>
+            <a:ext cx="6387662" cy="3846458"/>
+          </a:xfrm>
+          <a:prstGeom prst="rect">
+            <a:avLst/>
+          </a:prstGeom>
+        </p:spPr>
+      </p:pic>
+    </p:spTree>
+    <p:extLst>
+      <p:ext uri="{BB962C8B-B14F-4D97-AF65-F5344CB8AC3E}">
+        <p14:creationId xmlns:p14="http://schemas.microsoft.com/office/powerpoint/2010/main" val="3972678800"/>
+      </p:ext>
+    </p:extLst>
+  </p:cSld>
+  <p:clrMapOvr>
+    <a:masterClrMapping/>
+  </p:clrMapOvr>
+</p:sld>
+</file>
+
+<file path=ppt/slides/slide28.xml><?xml version="1.0" encoding="utf-8"?>
+<p:sld xmlns:a="http://schemas.openxmlformats.org/drawingml/2006/main" xmlns:r="http://schemas.openxmlformats.org/officeDocument/2006/relationships" xmlns:p="http://schemas.openxmlformats.org/presentationml/2006/main">
+  <p:cSld>
+    <p:spTree>
+      <p:nvGrpSpPr>
+        <p:cNvPr id="1" name=""/>
+        <p:cNvGrpSpPr/>
+        <p:nvPr/>
+      </p:nvGrpSpPr>
+      <p:grpSpPr>
+        <a:xfrm>
+          <a:off x="0" y="0"/>
+          <a:ext cx="0" cy="0"/>
+          <a:chOff x="0" y="0"/>
+          <a:chExt cx="0" cy="0"/>
+        </a:xfrm>
+      </p:grpSpPr>
+      <p:sp>
+        <p:nvSpPr>
+          <p:cNvPr id="2" name="Title 1">
+            <a:extLst>
+              <a:ext uri="{FF2B5EF4-FFF2-40B4-BE49-F238E27FC236}">
+                <a16:creationId xmlns:a16="http://schemas.microsoft.com/office/drawing/2014/main" id="{2D3B28D8-5D6F-46A6-81DC-5575A6753C70}"/>
+              </a:ext>
+            </a:extLst>
+          </p:cNvPr>
+          <p:cNvSpPr>
+            <a:spLocks noGrp="1"/>
+          </p:cNvSpPr>
+          <p:nvPr>
+            <p:ph type="title"/>
+          </p:nvPr>
+        </p:nvSpPr>
+        <p:spPr/>
+        <p:txBody>
+          <a:bodyPr/>
+          <a:lstStyle/>
+          <a:p>
+            <a:pPr algn="ctr"/>
+            <a:r>
+              <a:rPr lang="de-DE" dirty="0"/>
+              <a:t>Sound Code</a:t>
+            </a:r>
+          </a:p>
+        </p:txBody>
+      </p:sp>
+      <p:sp>
+        <p:nvSpPr>
+          <p:cNvPr id="4" name="Slide Number Placeholder 3">
+            <a:extLst>
+              <a:ext uri="{FF2B5EF4-FFF2-40B4-BE49-F238E27FC236}">
+                <a16:creationId xmlns:a16="http://schemas.microsoft.com/office/drawing/2014/main" id="{FB842887-6B03-46F8-8009-B826F2DE8693}"/>
+              </a:ext>
+            </a:extLst>
+          </p:cNvPr>
+          <p:cNvSpPr>
+            <a:spLocks noGrp="1"/>
+          </p:cNvSpPr>
+          <p:nvPr>
+            <p:ph type="sldNum" sz="quarter" idx="12"/>
+          </p:nvPr>
+        </p:nvSpPr>
+        <p:spPr/>
+        <p:txBody>
+          <a:bodyPr/>
+          <a:lstStyle/>
+          <a:p>
+            <a:fld id="{5FA8D64E-092D-488F-9555-4FE258A6A447}" type="slidenum">
+              <a:rPr lang="de-DE" smtClean="0"/>
+              <a:pPr/>
+              <a:t>28</a:t>
+            </a:fld>
+            <a:endParaRPr lang="de-DE" dirty="0"/>
+          </a:p>
+        </p:txBody>
+      </p:sp>
+      <p:pic>
+        <p:nvPicPr>
+          <p:cNvPr id="5" name="Content Placeholder 4" descr="A screenshot of a cell phone&#10;&#10;Description automatically generated">
+            <a:extLst>
+              <a:ext uri="{FF2B5EF4-FFF2-40B4-BE49-F238E27FC236}">
+                <a16:creationId xmlns:a16="http://schemas.microsoft.com/office/drawing/2014/main" id="{DDEE5997-0E44-4A57-A3E2-7884DBB2B2B0}"/>
+              </a:ext>
+            </a:extLst>
+          </p:cNvPr>
+          <p:cNvPicPr>
+            <a:picLocks noGrp="1" noChangeAspect="1"/>
+          </p:cNvPicPr>
+          <p:nvPr>
+            <p:ph idx="1"/>
+          </p:nvPr>
+        </p:nvPicPr>
+        <p:blipFill>
+          <a:blip r:embed="rId2">
+            <a:extLst>
+              <a:ext uri="{28A0092B-C50C-407E-A947-70E740481C1C}">
+                <a14:useLocalDpi xmlns:a14="http://schemas.microsoft.com/office/drawing/2010/main" val="0"/>
+              </a:ext>
+            </a:extLst>
+          </a:blip>
+          <a:stretch>
+            <a:fillRect/>
+          </a:stretch>
+        </p:blipFill>
+        <p:spPr>
+          <a:xfrm>
+            <a:off x="838200" y="1431509"/>
+            <a:ext cx="6472810" cy="1700574"/>
+          </a:xfrm>
+          <a:prstGeom prst="rect">
+            <a:avLst/>
+          </a:prstGeom>
+        </p:spPr>
+      </p:pic>
+      <p:pic>
+        <p:nvPicPr>
+          <p:cNvPr id="6" name="Picture 5">
+            <a:extLst>
+              <a:ext uri="{FF2B5EF4-FFF2-40B4-BE49-F238E27FC236}">
+                <a16:creationId xmlns:a16="http://schemas.microsoft.com/office/drawing/2014/main" id="{460CF55D-B037-4173-BD6C-D92C74A4404A}"/>
+              </a:ext>
+            </a:extLst>
+          </p:cNvPr>
+          <p:cNvPicPr>
+            <a:picLocks noChangeAspect="1"/>
+          </p:cNvPicPr>
+          <p:nvPr/>
+        </p:nvPicPr>
+        <p:blipFill>
+          <a:blip r:embed="rId3">
+            <a:extLst>
+              <a:ext uri="{28A0092B-C50C-407E-A947-70E740481C1C}">
+                <a14:useLocalDpi xmlns:a14="http://schemas.microsoft.com/office/drawing/2010/main" val="0"/>
+              </a:ext>
+            </a:extLst>
+          </a:blip>
+          <a:stretch>
+            <a:fillRect/>
+          </a:stretch>
+        </p:blipFill>
+        <p:spPr>
+          <a:xfrm>
+            <a:off x="838200" y="3396539"/>
+            <a:ext cx="5402980" cy="329379"/>
+          </a:xfrm>
+          <a:prstGeom prst="rect">
+            <a:avLst/>
+          </a:prstGeom>
+        </p:spPr>
+      </p:pic>
+    </p:spTree>
+    <p:extLst>
+      <p:ext uri="{BB962C8B-B14F-4D97-AF65-F5344CB8AC3E}">
+        <p14:creationId xmlns:p14="http://schemas.microsoft.com/office/powerpoint/2010/main" val="2321098173"/>
       </p:ext>
     </p:extLst>
   </p:cSld>
@@ -7478,10 +9195,15 @@
             <p:ph idx="1"/>
           </p:nvPr>
         </p:nvSpPr>
-        <p:spPr/>
+        <p:spPr>
+          <a:xfrm>
+            <a:off x="838200" y="1825625"/>
+            <a:ext cx="3376448" cy="2068458"/>
+          </a:xfrm>
+        </p:spPr>
         <p:txBody>
           <a:bodyPr>
-            <a:normAutofit fontScale="92500" lnSpcReduction="10000"/>
+            <a:normAutofit/>
           </a:bodyPr>
           <a:lstStyle/>
           <a:p>
@@ -7522,61 +9244,6 @@
             <a:r>
               <a:rPr lang="de-DE" dirty="0" err="1"/>
               <a:t>orientation</a:t>
-            </a:r>
-            <a:endParaRPr lang="de-DE" dirty="0"/>
-          </a:p>
-          <a:p>
-            <a:endParaRPr lang="de-DE" dirty="0"/>
-          </a:p>
-          <a:p>
-            <a:r>
-              <a:rPr lang="de-DE" dirty="0" err="1"/>
-              <a:t>ARKit</a:t>
-            </a:r>
-            <a:r>
-              <a:rPr lang="de-DE" dirty="0"/>
-              <a:t> </a:t>
-            </a:r>
-            <a:r>
-              <a:rPr lang="de-DE" dirty="0" err="1"/>
-              <a:t>or</a:t>
-            </a:r>
-            <a:r>
-              <a:rPr lang="de-DE" dirty="0"/>
-              <a:t> </a:t>
-            </a:r>
-            <a:r>
-              <a:rPr lang="de-DE" dirty="0" err="1"/>
-              <a:t>Camera</a:t>
-            </a:r>
-            <a:endParaRPr lang="de-DE" dirty="0"/>
-          </a:p>
-          <a:p>
-            <a:pPr lvl="1"/>
-            <a:r>
-              <a:rPr lang="de-DE" dirty="0"/>
-              <a:t>Light Sensor</a:t>
-            </a:r>
-          </a:p>
-          <a:p>
-            <a:endParaRPr lang="de-DE" dirty="0"/>
-          </a:p>
-          <a:p>
-            <a:r>
-              <a:rPr lang="de-DE" dirty="0" err="1"/>
-              <a:t>AVFoundation</a:t>
-            </a:r>
-            <a:endParaRPr lang="de-DE" dirty="0"/>
-          </a:p>
-          <a:p>
-            <a:pPr lvl="1"/>
-            <a:r>
-              <a:rPr lang="de-DE" dirty="0"/>
-              <a:t>Play </a:t>
-            </a:r>
-            <a:r>
-              <a:rPr lang="de-DE" dirty="0" err="1"/>
-              <a:t>sounds</a:t>
             </a:r>
             <a:endParaRPr lang="de-DE" dirty="0"/>
           </a:p>
@@ -7705,6 +9372,127 @@
           </a:extLst>
         </p:spPr>
       </p:pic>
+      <p:sp>
+        <p:nvSpPr>
+          <p:cNvPr id="5" name="TextBox 4">
+            <a:extLst>
+              <a:ext uri="{FF2B5EF4-FFF2-40B4-BE49-F238E27FC236}">
+                <a16:creationId xmlns:a16="http://schemas.microsoft.com/office/drawing/2014/main" id="{B2FB9602-DC86-442D-9A72-E54F61FE1AA6}"/>
+              </a:ext>
+            </a:extLst>
+          </p:cNvPr>
+          <p:cNvSpPr txBox="1"/>
+          <p:nvPr/>
+        </p:nvSpPr>
+        <p:spPr>
+          <a:xfrm>
+            <a:off x="798785" y="4145648"/>
+            <a:ext cx="3599793" cy="892552"/>
+          </a:xfrm>
+          <a:prstGeom prst="rect">
+            <a:avLst/>
+          </a:prstGeom>
+          <a:noFill/>
+        </p:spPr>
+        <p:txBody>
+          <a:bodyPr wrap="square" rtlCol="0">
+            <a:spAutoFit/>
+          </a:bodyPr>
+          <a:lstStyle/>
+          <a:p>
+            <a:pPr marL="285750" indent="-285750">
+              <a:buFont typeface="Arial" panose="020B0604020202020204" pitchFamily="34" charset="0"/>
+              <a:buChar char="•"/>
+            </a:pPr>
+            <a:r>
+              <a:rPr lang="de-DE" sz="2800" dirty="0" err="1"/>
+              <a:t>ARKit</a:t>
+            </a:r>
+            <a:r>
+              <a:rPr lang="de-DE" sz="2800" dirty="0"/>
+              <a:t> </a:t>
+            </a:r>
+            <a:r>
+              <a:rPr lang="de-DE" sz="2800" dirty="0" err="1"/>
+              <a:t>or</a:t>
+            </a:r>
+            <a:r>
+              <a:rPr lang="de-DE" sz="2800" dirty="0"/>
+              <a:t> </a:t>
+            </a:r>
+            <a:r>
+              <a:rPr lang="de-DE" sz="2800" dirty="0" err="1"/>
+              <a:t>Camera</a:t>
+            </a:r>
+            <a:endParaRPr lang="de-DE" sz="2800" dirty="0"/>
+          </a:p>
+          <a:p>
+            <a:pPr marL="742950" lvl="1" indent="-285750">
+              <a:buFont typeface="Arial" panose="020B0604020202020204" pitchFamily="34" charset="0"/>
+              <a:buChar char="•"/>
+            </a:pPr>
+            <a:r>
+              <a:rPr lang="de-DE" sz="2400" dirty="0"/>
+              <a:t>Light Sensor</a:t>
+            </a:r>
+          </a:p>
+        </p:txBody>
+      </p:sp>
+      <p:sp>
+        <p:nvSpPr>
+          <p:cNvPr id="6" name="TextBox 5">
+            <a:extLst>
+              <a:ext uri="{FF2B5EF4-FFF2-40B4-BE49-F238E27FC236}">
+                <a16:creationId xmlns:a16="http://schemas.microsoft.com/office/drawing/2014/main" id="{DC27C706-7321-4544-991D-E9C0F7CE1BC5}"/>
+              </a:ext>
+            </a:extLst>
+          </p:cNvPr>
+          <p:cNvSpPr txBox="1"/>
+          <p:nvPr/>
+        </p:nvSpPr>
+        <p:spPr>
+          <a:xfrm>
+            <a:off x="838200" y="5289765"/>
+            <a:ext cx="3294994" cy="892552"/>
+          </a:xfrm>
+          <a:prstGeom prst="rect">
+            <a:avLst/>
+          </a:prstGeom>
+          <a:noFill/>
+        </p:spPr>
+        <p:txBody>
+          <a:bodyPr wrap="square" rtlCol="0">
+            <a:spAutoFit/>
+          </a:bodyPr>
+          <a:lstStyle/>
+          <a:p>
+            <a:pPr marL="342900" indent="-342900">
+              <a:buFont typeface="Arial" panose="020B0604020202020204" pitchFamily="34" charset="0"/>
+              <a:buChar char="•"/>
+            </a:pPr>
+            <a:r>
+              <a:rPr lang="de-DE" sz="2800" dirty="0" err="1"/>
+              <a:t>AVFoundation</a:t>
+            </a:r>
+            <a:endParaRPr lang="de-DE" sz="2800" dirty="0"/>
+          </a:p>
+          <a:p>
+            <a:pPr marL="800100" lvl="1" indent="-342900">
+              <a:buFont typeface="Arial" panose="020B0604020202020204" pitchFamily="34" charset="0"/>
+              <a:buChar char="•"/>
+            </a:pPr>
+            <a:r>
+              <a:rPr lang="de-DE" sz="2400" dirty="0"/>
+              <a:t>Plays </a:t>
+            </a:r>
+            <a:r>
+              <a:rPr lang="de-DE" sz="2400" dirty="0" err="1"/>
+              <a:t>sounds</a:t>
+            </a:r>
+            <a:endParaRPr lang="de-DE" sz="2400" dirty="0"/>
+          </a:p>
+        </p:txBody>
+      </p:sp>
     </p:spTree>
     <p:extLst>
       <p:ext uri="{BB962C8B-B14F-4D97-AF65-F5344CB8AC3E}">
@@ -7715,6 +9503,385 @@
   <p:clrMapOvr>
     <a:masterClrMapping/>
   </p:clrMapOvr>
+  <p:timing>
+    <p:tnLst>
+      <p:par>
+        <p:cTn id="1" dur="indefinite" restart="never" nodeType="tmRoot">
+          <p:childTnLst>
+            <p:seq concurrent="1" nextAc="seek">
+              <p:cTn id="2" dur="indefinite" nodeType="mainSeq">
+                <p:childTnLst>
+                  <p:par>
+                    <p:cTn id="3" fill="hold">
+                      <p:stCondLst>
+                        <p:cond delay="indefinite"/>
+                      </p:stCondLst>
+                      <p:childTnLst>
+                        <p:par>
+                          <p:cTn id="4" fill="hold">
+                            <p:stCondLst>
+                              <p:cond delay="0"/>
+                            </p:stCondLst>
+                            <p:childTnLst>
+                              <p:par>
+                                <p:cTn id="5" presetID="1" presetClass="entr" presetSubtype="0" fill="hold" grpId="0" nodeType="clickEffect">
+                                  <p:stCondLst>
+                                    <p:cond delay="0"/>
+                                  </p:stCondLst>
+                                  <p:childTnLst>
+                                    <p:set>
+                                      <p:cBhvr>
+                                        <p:cTn id="6" dur="1" fill="hold">
+                                          <p:stCondLst>
+                                            <p:cond delay="0"/>
+                                          </p:stCondLst>
+                                        </p:cTn>
+                                        <p:tgtEl>
+                                          <p:spTgt spid="3">
+                                            <p:txEl>
+                                              <p:pRg st="0" end="0"/>
+                                            </p:txEl>
+                                          </p:spTgt>
+                                        </p:tgtEl>
+                                        <p:attrNameLst>
+                                          <p:attrName>style.visibility</p:attrName>
+                                        </p:attrNameLst>
+                                      </p:cBhvr>
+                                      <p:to>
+                                        <p:strVal val="visible"/>
+                                      </p:to>
+                                    </p:set>
+                                  </p:childTnLst>
+                                </p:cTn>
+                              </p:par>
+                              <p:par>
+                                <p:cTn id="7" presetID="1" presetClass="entr" presetSubtype="0" fill="hold" grpId="0" nodeType="withEffect">
+                                  <p:stCondLst>
+                                    <p:cond delay="0"/>
+                                  </p:stCondLst>
+                                  <p:childTnLst>
+                                    <p:set>
+                                      <p:cBhvr>
+                                        <p:cTn id="8" dur="1" fill="hold">
+                                          <p:stCondLst>
+                                            <p:cond delay="0"/>
+                                          </p:stCondLst>
+                                        </p:cTn>
+                                        <p:tgtEl>
+                                          <p:spTgt spid="3">
+                                            <p:txEl>
+                                              <p:pRg st="1" end="1"/>
+                                            </p:txEl>
+                                          </p:spTgt>
+                                        </p:tgtEl>
+                                        <p:attrNameLst>
+                                          <p:attrName>style.visibility</p:attrName>
+                                        </p:attrNameLst>
+                                      </p:cBhvr>
+                                      <p:to>
+                                        <p:strVal val="visible"/>
+                                      </p:to>
+                                    </p:set>
+                                  </p:childTnLst>
+                                </p:cTn>
+                              </p:par>
+                              <p:par>
+                                <p:cTn id="9" presetID="1" presetClass="entr" presetSubtype="0" fill="hold" grpId="0" nodeType="withEffect">
+                                  <p:stCondLst>
+                                    <p:cond delay="0"/>
+                                  </p:stCondLst>
+                                  <p:childTnLst>
+                                    <p:set>
+                                      <p:cBhvr>
+                                        <p:cTn id="10" dur="1" fill="hold">
+                                          <p:stCondLst>
+                                            <p:cond delay="0"/>
+                                          </p:stCondLst>
+                                        </p:cTn>
+                                        <p:tgtEl>
+                                          <p:spTgt spid="3">
+                                            <p:txEl>
+                                              <p:pRg st="2" end="2"/>
+                                            </p:txEl>
+                                          </p:spTgt>
+                                        </p:tgtEl>
+                                        <p:attrNameLst>
+                                          <p:attrName>style.visibility</p:attrName>
+                                        </p:attrNameLst>
+                                      </p:cBhvr>
+                                      <p:to>
+                                        <p:strVal val="visible"/>
+                                      </p:to>
+                                    </p:set>
+                                  </p:childTnLst>
+                                </p:cTn>
+                              </p:par>
+                              <p:par>
+                                <p:cTn id="11" presetID="1" presetClass="entr" presetSubtype="0" fill="hold" grpId="0" nodeType="withEffect">
+                                  <p:stCondLst>
+                                    <p:cond delay="0"/>
+                                  </p:stCondLst>
+                                  <p:childTnLst>
+                                    <p:set>
+                                      <p:cBhvr>
+                                        <p:cTn id="12" dur="1" fill="hold">
+                                          <p:stCondLst>
+                                            <p:cond delay="0"/>
+                                          </p:stCondLst>
+                                        </p:cTn>
+                                        <p:tgtEl>
+                                          <p:spTgt spid="3">
+                                            <p:txEl>
+                                              <p:pRg st="3" end="3"/>
+                                            </p:txEl>
+                                          </p:spTgt>
+                                        </p:tgtEl>
+                                        <p:attrNameLst>
+                                          <p:attrName>style.visibility</p:attrName>
+                                        </p:attrNameLst>
+                                      </p:cBhvr>
+                                      <p:to>
+                                        <p:strVal val="visible"/>
+                                      </p:to>
+                                    </p:set>
+                                  </p:childTnLst>
+                                </p:cTn>
+                              </p:par>
+                              <p:par>
+                                <p:cTn id="13" presetID="1" presetClass="entr" presetSubtype="0" fill="hold" grpId="0" nodeType="withEffect">
+                                  <p:stCondLst>
+                                    <p:cond delay="0"/>
+                                  </p:stCondLst>
+                                  <p:childTnLst>
+                                    <p:set>
+                                      <p:cBhvr>
+                                        <p:cTn id="14" dur="1" fill="hold">
+                                          <p:stCondLst>
+                                            <p:cond delay="0"/>
+                                          </p:stCondLst>
+                                        </p:cTn>
+                                        <p:tgtEl>
+                                          <p:spTgt spid="3">
+                                            <p:txEl>
+                                              <p:pRg st="4" end="4"/>
+                                            </p:txEl>
+                                          </p:spTgt>
+                                        </p:tgtEl>
+                                        <p:attrNameLst>
+                                          <p:attrName>style.visibility</p:attrName>
+                                        </p:attrNameLst>
+                                      </p:cBhvr>
+                                      <p:to>
+                                        <p:strVal val="visible"/>
+                                      </p:to>
+                                    </p:set>
+                                  </p:childTnLst>
+                                </p:cTn>
+                              </p:par>
+                              <p:par>
+                                <p:cTn id="15" presetID="1" presetClass="entr" presetSubtype="0" fill="hold" nodeType="withEffect">
+                                  <p:stCondLst>
+                                    <p:cond delay="0"/>
+                                  </p:stCondLst>
+                                  <p:childTnLst>
+                                    <p:set>
+                                      <p:cBhvr>
+                                        <p:cTn id="16" dur="1" fill="hold">
+                                          <p:stCondLst>
+                                            <p:cond delay="0"/>
+                                          </p:stCondLst>
+                                        </p:cTn>
+                                        <p:tgtEl>
+                                          <p:spTgt spid="6146"/>
+                                        </p:tgtEl>
+                                        <p:attrNameLst>
+                                          <p:attrName>style.visibility</p:attrName>
+                                        </p:attrNameLst>
+                                      </p:cBhvr>
+                                      <p:to>
+                                        <p:strVal val="visible"/>
+                                      </p:to>
+                                    </p:set>
+                                  </p:childTnLst>
+                                </p:cTn>
+                              </p:par>
+                            </p:childTnLst>
+                          </p:cTn>
+                        </p:par>
+                      </p:childTnLst>
+                    </p:cTn>
+                  </p:par>
+                  <p:par>
+                    <p:cTn id="17" fill="hold">
+                      <p:stCondLst>
+                        <p:cond delay="indefinite"/>
+                      </p:stCondLst>
+                      <p:childTnLst>
+                        <p:par>
+                          <p:cTn id="18" fill="hold">
+                            <p:stCondLst>
+                              <p:cond delay="0"/>
+                            </p:stCondLst>
+                            <p:childTnLst>
+                              <p:par>
+                                <p:cTn id="19" presetID="1" presetClass="entr" presetSubtype="0" fill="hold" grpId="0" nodeType="clickEffect">
+                                  <p:stCondLst>
+                                    <p:cond delay="0"/>
+                                  </p:stCondLst>
+                                  <p:childTnLst>
+                                    <p:set>
+                                      <p:cBhvr>
+                                        <p:cTn id="20" dur="1" fill="hold">
+                                          <p:stCondLst>
+                                            <p:cond delay="0"/>
+                                          </p:stCondLst>
+                                        </p:cTn>
+                                        <p:tgtEl>
+                                          <p:spTgt spid="5"/>
+                                        </p:tgtEl>
+                                        <p:attrNameLst>
+                                          <p:attrName>style.visibility</p:attrName>
+                                        </p:attrNameLst>
+                                      </p:cBhvr>
+                                      <p:to>
+                                        <p:strVal val="visible"/>
+                                      </p:to>
+                                    </p:set>
+                                  </p:childTnLst>
+                                </p:cTn>
+                              </p:par>
+                              <p:par>
+                                <p:cTn id="21" presetID="1" presetClass="entr" presetSubtype="0" fill="hold" nodeType="withEffect">
+                                  <p:stCondLst>
+                                    <p:cond delay="0"/>
+                                  </p:stCondLst>
+                                  <p:childTnLst>
+                                    <p:set>
+                                      <p:cBhvr>
+                                        <p:cTn id="22" dur="1" fill="hold">
+                                          <p:stCondLst>
+                                            <p:cond delay="0"/>
+                                          </p:stCondLst>
+                                        </p:cTn>
+                                        <p:tgtEl>
+                                          <p:spTgt spid="6148"/>
+                                        </p:tgtEl>
+                                        <p:attrNameLst>
+                                          <p:attrName>style.visibility</p:attrName>
+                                        </p:attrNameLst>
+                                      </p:cBhvr>
+                                      <p:to>
+                                        <p:strVal val="visible"/>
+                                      </p:to>
+                                    </p:set>
+                                  </p:childTnLst>
+                                </p:cTn>
+                              </p:par>
+                            </p:childTnLst>
+                          </p:cTn>
+                        </p:par>
+                      </p:childTnLst>
+                    </p:cTn>
+                  </p:par>
+                  <p:par>
+                    <p:cTn id="23" fill="hold">
+                      <p:stCondLst>
+                        <p:cond delay="indefinite"/>
+                      </p:stCondLst>
+                      <p:childTnLst>
+                        <p:par>
+                          <p:cTn id="24" fill="hold">
+                            <p:stCondLst>
+                              <p:cond delay="0"/>
+                            </p:stCondLst>
+                            <p:childTnLst>
+                              <p:par>
+                                <p:cTn id="25" presetID="1" presetClass="entr" presetSubtype="0" fill="hold" grpId="0" nodeType="clickEffect">
+                                  <p:stCondLst>
+                                    <p:cond delay="0"/>
+                                  </p:stCondLst>
+                                  <p:childTnLst>
+                                    <p:set>
+                                      <p:cBhvr>
+                                        <p:cTn id="26" dur="1" fill="hold">
+                                          <p:stCondLst>
+                                            <p:cond delay="0"/>
+                                          </p:stCondLst>
+                                        </p:cTn>
+                                        <p:tgtEl>
+                                          <p:spTgt spid="6"/>
+                                        </p:tgtEl>
+                                        <p:attrNameLst>
+                                          <p:attrName>style.visibility</p:attrName>
+                                        </p:attrNameLst>
+                                      </p:cBhvr>
+                                      <p:to>
+                                        <p:strVal val="visible"/>
+                                      </p:to>
+                                    </p:set>
+                                  </p:childTnLst>
+                                </p:cTn>
+                              </p:par>
+                              <p:par>
+                                <p:cTn id="27" presetID="1" presetClass="entr" presetSubtype="0" fill="hold" nodeType="withEffect">
+                                  <p:stCondLst>
+                                    <p:cond delay="0"/>
+                                  </p:stCondLst>
+                                  <p:childTnLst>
+                                    <p:set>
+                                      <p:cBhvr>
+                                        <p:cTn id="28" dur="1" fill="hold">
+                                          <p:stCondLst>
+                                            <p:cond delay="0"/>
+                                          </p:stCondLst>
+                                        </p:cTn>
+                                        <p:tgtEl>
+                                          <p:spTgt spid="6150"/>
+                                        </p:tgtEl>
+                                        <p:attrNameLst>
+                                          <p:attrName>style.visibility</p:attrName>
+                                        </p:attrNameLst>
+                                      </p:cBhvr>
+                                      <p:to>
+                                        <p:strVal val="visible"/>
+                                      </p:to>
+                                    </p:set>
+                                  </p:childTnLst>
+                                </p:cTn>
+                              </p:par>
+                            </p:childTnLst>
+                          </p:cTn>
+                        </p:par>
+                      </p:childTnLst>
+                    </p:cTn>
+                  </p:par>
+                </p:childTnLst>
+              </p:cTn>
+              <p:prevCondLst>
+                <p:cond evt="onPrev" delay="0">
+                  <p:tgtEl>
+                    <p:sldTgt/>
+                  </p:tgtEl>
+                </p:cond>
+              </p:prevCondLst>
+              <p:nextCondLst>
+                <p:cond evt="onNext" delay="0">
+                  <p:tgtEl>
+                    <p:sldTgt/>
+                  </p:tgtEl>
+                </p:cond>
+              </p:nextCondLst>
+            </p:seq>
+          </p:childTnLst>
+        </p:cTn>
+      </p:par>
+    </p:tnLst>
+    <p:bldLst>
+      <p:bldP spid="3" grpId="0" build="p"/>
+      <p:bldP spid="5" grpId="0"/>
+      <p:bldP spid="6" grpId="0"/>
+    </p:bldLst>
+  </p:timing>
 </p:sld>
 </file>
 
@@ -8230,7 +10397,7 @@
             </a:r>
             <a:r>
               <a:rPr lang="de-DE" dirty="0" err="1"/>
-              <a:t>stays</a:t>
+              <a:t>value</a:t>
             </a:r>
             <a:r>
               <a:rPr lang="de-DE" dirty="0"/>
@@ -8238,11 +10405,19 @@
             </a:r>
             <a:r>
               <a:rPr lang="de-DE" dirty="0" err="1"/>
-              <a:t>the</a:t>
-            </a:r>
-            <a:r>
-              <a:rPr lang="de-DE" dirty="0"/>
-              <a:t> same, </a:t>
+              <a:t>does</a:t>
+            </a:r>
+            <a:r>
+              <a:rPr lang="de-DE" dirty="0"/>
+              <a:t> not </a:t>
+            </a:r>
+            <a:r>
+              <a:rPr lang="de-DE" dirty="0" err="1"/>
+              <a:t>change</a:t>
+            </a:r>
+            <a:r>
+              <a:rPr lang="de-DE" dirty="0"/>
+              <a:t>, </a:t>
             </a:r>
             <a:r>
               <a:rPr lang="de-DE" dirty="0" err="1"/>
@@ -8254,7 +10429,7 @@
             </a:r>
             <a:r>
               <a:rPr lang="de-DE" dirty="0" err="1"/>
-              <a:t>you</a:t>
+              <a:t>one</a:t>
             </a:r>
             <a:r>
               <a:rPr lang="de-DE" dirty="0"/>
@@ -8262,7 +10437,7 @@
             </a:r>
             <a:r>
               <a:rPr lang="de-DE" dirty="0" err="1"/>
-              <a:t>rotate</a:t>
+              <a:t>rotates</a:t>
             </a:r>
             <a:r>
               <a:rPr lang="de-DE" dirty="0"/>
@@ -8349,6 +10524,183 @@
   <p:clrMapOvr>
     <a:masterClrMapping/>
   </p:clrMapOvr>
+  <p:timing>
+    <p:tnLst>
+      <p:par>
+        <p:cTn id="1" dur="indefinite" restart="never" nodeType="tmRoot">
+          <p:childTnLst>
+            <p:seq concurrent="1" nextAc="seek">
+              <p:cTn id="2" dur="indefinite" nodeType="mainSeq">
+                <p:childTnLst>
+                  <p:par>
+                    <p:cTn id="3" fill="hold">
+                      <p:stCondLst>
+                        <p:cond delay="indefinite"/>
+                      </p:stCondLst>
+                      <p:childTnLst>
+                        <p:par>
+                          <p:cTn id="4" fill="hold">
+                            <p:stCondLst>
+                              <p:cond delay="0"/>
+                            </p:stCondLst>
+                            <p:childTnLst>
+                              <p:par>
+                                <p:cTn id="5" presetID="1" presetClass="entr" presetSubtype="0" fill="hold" nodeType="clickEffect">
+                                  <p:stCondLst>
+                                    <p:cond delay="0"/>
+                                  </p:stCondLst>
+                                  <p:childTnLst>
+                                    <p:set>
+                                      <p:cBhvr>
+                                        <p:cTn id="6" dur="1" fill="hold">
+                                          <p:stCondLst>
+                                            <p:cond delay="0"/>
+                                          </p:stCondLst>
+                                        </p:cTn>
+                                        <p:tgtEl>
+                                          <p:spTgt spid="3">
+                                            <p:txEl>
+                                              <p:pRg st="4" end="4"/>
+                                            </p:txEl>
+                                          </p:spTgt>
+                                        </p:tgtEl>
+                                        <p:attrNameLst>
+                                          <p:attrName>style.visibility</p:attrName>
+                                        </p:attrNameLst>
+                                      </p:cBhvr>
+                                      <p:to>
+                                        <p:strVal val="visible"/>
+                                      </p:to>
+                                    </p:set>
+                                  </p:childTnLst>
+                                </p:cTn>
+                              </p:par>
+                            </p:childTnLst>
+                          </p:cTn>
+                        </p:par>
+                      </p:childTnLst>
+                    </p:cTn>
+                  </p:par>
+                  <p:par>
+                    <p:cTn id="7" fill="hold">
+                      <p:stCondLst>
+                        <p:cond delay="indefinite"/>
+                      </p:stCondLst>
+                      <p:childTnLst>
+                        <p:par>
+                          <p:cTn id="8" fill="hold">
+                            <p:stCondLst>
+                              <p:cond delay="0"/>
+                            </p:stCondLst>
+                            <p:childTnLst>
+                              <p:par>
+                                <p:cTn id="9" presetID="1" presetClass="entr" presetSubtype="0" fill="hold" nodeType="clickEffect">
+                                  <p:stCondLst>
+                                    <p:cond delay="0"/>
+                                  </p:stCondLst>
+                                  <p:childTnLst>
+                                    <p:set>
+                                      <p:cBhvr>
+                                        <p:cTn id="10" dur="1" fill="hold">
+                                          <p:stCondLst>
+                                            <p:cond delay="0"/>
+                                          </p:stCondLst>
+                                        </p:cTn>
+                                        <p:tgtEl>
+                                          <p:spTgt spid="3">
+                                            <p:txEl>
+                                              <p:pRg st="6" end="6"/>
+                                            </p:txEl>
+                                          </p:spTgt>
+                                        </p:tgtEl>
+                                        <p:attrNameLst>
+                                          <p:attrName>style.visibility</p:attrName>
+                                        </p:attrNameLst>
+                                      </p:cBhvr>
+                                      <p:to>
+                                        <p:strVal val="visible"/>
+                                      </p:to>
+                                    </p:set>
+                                  </p:childTnLst>
+                                </p:cTn>
+                              </p:par>
+                            </p:childTnLst>
+                          </p:cTn>
+                        </p:par>
+                      </p:childTnLst>
+                    </p:cTn>
+                  </p:par>
+                  <p:par>
+                    <p:cTn id="11" fill="hold">
+                      <p:stCondLst>
+                        <p:cond delay="indefinite"/>
+                      </p:stCondLst>
+                      <p:childTnLst>
+                        <p:par>
+                          <p:cTn id="12" fill="hold">
+                            <p:stCondLst>
+                              <p:cond delay="0"/>
+                            </p:stCondLst>
+                            <p:childTnLst>
+                              <p:par>
+                                <p:cTn id="13" presetID="1" presetClass="entr" presetSubtype="0" fill="hold" nodeType="clickEffect">
+                                  <p:stCondLst>
+                                    <p:cond delay="0"/>
+                                  </p:stCondLst>
+                                  <p:childTnLst>
+                                    <p:set>
+                                      <p:cBhvr>
+                                        <p:cTn id="14" dur="1" fill="hold">
+                                          <p:stCondLst>
+                                            <p:cond delay="0"/>
+                                          </p:stCondLst>
+                                        </p:cTn>
+                                        <p:tgtEl>
+                                          <p:spTgt spid="3">
+                                            <p:txEl>
+                                              <p:pRg st="8" end="8"/>
+                                            </p:txEl>
+                                          </p:spTgt>
+                                        </p:tgtEl>
+                                        <p:attrNameLst>
+                                          <p:attrName>style.visibility</p:attrName>
+                                        </p:attrNameLst>
+                                      </p:cBhvr>
+                                      <p:to>
+                                        <p:strVal val="visible"/>
+                                      </p:to>
+                                    </p:set>
+                                  </p:childTnLst>
+                                </p:cTn>
+                              </p:par>
+                            </p:childTnLst>
+                          </p:cTn>
+                        </p:par>
+                      </p:childTnLst>
+                    </p:cTn>
+                  </p:par>
+                </p:childTnLst>
+              </p:cTn>
+              <p:prevCondLst>
+                <p:cond evt="onPrev" delay="0">
+                  <p:tgtEl>
+                    <p:sldTgt/>
+                  </p:tgtEl>
+                </p:cond>
+              </p:prevCondLst>
+              <p:nextCondLst>
+                <p:cond evt="onNext" delay="0">
+                  <p:tgtEl>
+                    <p:sldTgt/>
+                  </p:tgtEl>
+                </p:cond>
+              </p:nextCondLst>
+            </p:seq>
+          </p:childTnLst>
+        </p:cTn>
+      </p:par>
+    </p:tnLst>
+  </p:timing>
 </p:sld>
 </file>
 

</xml_diff>